<commit_message>
powerpoint sucks. Had to redo from pdf.
</commit_message>
<xml_diff>
--- a/lectures/4.1StackHeapRefsHigherOrderFcts/lecture.pptx
+++ b/lectures/4.1StackHeapRefsHigherOrderFcts/lecture.pptx
@@ -5,16 +5,18 @@
     <p:sldMasterId id="2147483648" r:id="rId1"/>
   </p:sldMasterIdLst>
   <p:notesMasterIdLst>
-    <p:notesMasterId r:id="rId9"/>
+    <p:notesMasterId r:id="rId11"/>
   </p:notesMasterIdLst>
   <p:sldIdLst>
     <p:sldId id="256" r:id="rId2"/>
     <p:sldId id="257" r:id="rId3"/>
     <p:sldId id="313" r:id="rId4"/>
-    <p:sldId id="310" r:id="rId5"/>
-    <p:sldId id="311" r:id="rId6"/>
-    <p:sldId id="312" r:id="rId7"/>
-    <p:sldId id="303" r:id="rId8"/>
+    <p:sldId id="314" r:id="rId5"/>
+    <p:sldId id="315" r:id="rId6"/>
+    <p:sldId id="310" r:id="rId7"/>
+    <p:sldId id="311" r:id="rId8"/>
+    <p:sldId id="312" r:id="rId9"/>
+    <p:sldId id="303" r:id="rId10"/>
   </p:sldIdLst>
   <p:sldSz cx="12192000" cy="6858000"/>
   <p:notesSz cx="6858000" cy="9144000"/>
@@ -203,7 +205,7 @@
           <a:p>
             <a:fld id="{248031C6-E4B0-0444-A4A8-9CCE96EC2C9C}" type="datetimeFigureOut">
               <a:rPr lang="en-GB" smtClean="0"/>
-              <a:t>19/09/2018</a:t>
+              <a:t>22/09/2018</a:t>
             </a:fld>
             <a:endParaRPr lang="en-GB"/>
           </a:p>
@@ -620,7 +622,7 @@
           <a:p>
             <a:fld id="{66665395-52C5-5E4B-BB20-CD4E0BBC9899}" type="datetimeFigureOut">
               <a:rPr lang="en-GB" smtClean="0"/>
-              <a:t>19/09/2018</a:t>
+              <a:t>22/09/2018</a:t>
             </a:fld>
             <a:endParaRPr lang="en-GB"/>
           </a:p>
@@ -820,7 +822,7 @@
           <a:p>
             <a:fld id="{66665395-52C5-5E4B-BB20-CD4E0BBC9899}" type="datetimeFigureOut">
               <a:rPr lang="en-GB" smtClean="0"/>
-              <a:t>19/09/2018</a:t>
+              <a:t>22/09/2018</a:t>
             </a:fld>
             <a:endParaRPr lang="en-GB"/>
           </a:p>
@@ -1030,7 +1032,7 @@
           <a:p>
             <a:fld id="{66665395-52C5-5E4B-BB20-CD4E0BBC9899}" type="datetimeFigureOut">
               <a:rPr lang="en-GB" smtClean="0"/>
-              <a:t>19/09/2018</a:t>
+              <a:t>22/09/2018</a:t>
             </a:fld>
             <a:endParaRPr lang="en-GB"/>
           </a:p>
@@ -1230,7 +1232,7 @@
           <a:p>
             <a:fld id="{66665395-52C5-5E4B-BB20-CD4E0BBC9899}" type="datetimeFigureOut">
               <a:rPr lang="en-GB" smtClean="0"/>
-              <a:t>19/09/2018</a:t>
+              <a:t>22/09/2018</a:t>
             </a:fld>
             <a:endParaRPr lang="en-GB"/>
           </a:p>
@@ -1506,7 +1508,7 @@
           <a:p>
             <a:fld id="{66665395-52C5-5E4B-BB20-CD4E0BBC9899}" type="datetimeFigureOut">
               <a:rPr lang="en-GB" smtClean="0"/>
-              <a:t>19/09/2018</a:t>
+              <a:t>22/09/2018</a:t>
             </a:fld>
             <a:endParaRPr lang="en-GB"/>
           </a:p>
@@ -1774,7 +1776,7 @@
           <a:p>
             <a:fld id="{66665395-52C5-5E4B-BB20-CD4E0BBC9899}" type="datetimeFigureOut">
               <a:rPr lang="en-GB" smtClean="0"/>
-              <a:t>19/09/2018</a:t>
+              <a:t>22/09/2018</a:t>
             </a:fld>
             <a:endParaRPr lang="en-GB"/>
           </a:p>
@@ -2189,7 +2191,7 @@
           <a:p>
             <a:fld id="{66665395-52C5-5E4B-BB20-CD4E0BBC9899}" type="datetimeFigureOut">
               <a:rPr lang="en-GB" smtClean="0"/>
-              <a:t>19/09/2018</a:t>
+              <a:t>22/09/2018</a:t>
             </a:fld>
             <a:endParaRPr lang="en-GB"/>
           </a:p>
@@ -2331,7 +2333,7 @@
           <a:p>
             <a:fld id="{66665395-52C5-5E4B-BB20-CD4E0BBC9899}" type="datetimeFigureOut">
               <a:rPr lang="en-GB" smtClean="0"/>
-              <a:t>19/09/2018</a:t>
+              <a:t>22/09/2018</a:t>
             </a:fld>
             <a:endParaRPr lang="en-GB"/>
           </a:p>
@@ -2444,7 +2446,7 @@
           <a:p>
             <a:fld id="{66665395-52C5-5E4B-BB20-CD4E0BBC9899}" type="datetimeFigureOut">
               <a:rPr lang="en-GB" smtClean="0"/>
-              <a:t>19/09/2018</a:t>
+              <a:t>22/09/2018</a:t>
             </a:fld>
             <a:endParaRPr lang="en-GB"/>
           </a:p>
@@ -2757,7 +2759,7 @@
           <a:p>
             <a:fld id="{66665395-52C5-5E4B-BB20-CD4E0BBC9899}" type="datetimeFigureOut">
               <a:rPr lang="en-GB" smtClean="0"/>
-              <a:t>19/09/2018</a:t>
+              <a:t>22/09/2018</a:t>
             </a:fld>
             <a:endParaRPr lang="en-GB"/>
           </a:p>
@@ -3046,7 +3048,7 @@
           <a:p>
             <a:fld id="{66665395-52C5-5E4B-BB20-CD4E0BBC9899}" type="datetimeFigureOut">
               <a:rPr lang="en-GB" smtClean="0"/>
-              <a:t>19/09/2018</a:t>
+              <a:t>22/09/2018</a:t>
             </a:fld>
             <a:endParaRPr lang="en-GB"/>
           </a:p>
@@ -3289,7 +3291,7 @@
           <a:p>
             <a:fld id="{66665395-52C5-5E4B-BB20-CD4E0BBC9899}" type="datetimeFigureOut">
               <a:rPr lang="en-GB" smtClean="0"/>
-              <a:t>19/09/2018</a:t>
+              <a:t>22/09/2018</a:t>
             </a:fld>
             <a:endParaRPr lang="en-GB"/>
           </a:p>
@@ -3750,23 +3752,23 @@
             <p:ph type="subTitle" idx="1"/>
           </p:nvPr>
         </p:nvSpPr>
-        <p:spPr/>
+        <p:spPr>
+          <a:xfrm>
+            <a:off x="792480" y="3602038"/>
+            <a:ext cx="10769600" cy="1655762"/>
+          </a:xfrm>
+        </p:spPr>
         <p:txBody>
           <a:bodyPr/>
           <a:lstStyle/>
           <a:p>
             <a:r>
               <a:rPr lang="da-DK" dirty="0"/>
-              <a:t>3.3: </a:t>
-            </a:r>
-            <a:r>
-              <a:rPr lang="da-DK" dirty="0" err="1"/>
-              <a:t>Tupler</a:t>
-            </a:r>
-            <a:r>
-              <a:rPr lang="da-DK" dirty="0"/>
-              <a:t>, betingelser, højere-ordens funktioner</a:t>
-            </a:r>
+              <a:t>4.1: Kaldestakken, bunken, referenceceller, højere-ordens og anonyme funktioner </a:t>
+            </a:r>
+            <a:endParaRPr lang="da-DK" dirty="0">
+              <a:effectLst/>
+            </a:endParaRPr>
           </a:p>
         </p:txBody>
       </p:sp>
@@ -4133,17 +4135,25 @@
           </a:lstStyle>
           <a:p>
             <a:r>
+              <a:rPr lang="da-DK" sz="2200" dirty="0" err="1"/>
+              <a:t>Tupler</a:t>
+            </a:r>
+            <a:endParaRPr lang="da-DK" sz="2200" dirty="0"/>
+          </a:p>
+          <a:p>
+            <a:r>
+              <a:rPr lang="da-DK" sz="2200" dirty="0"/>
+              <a:t>Betingelser</a:t>
+            </a:r>
+            <a:r>
               <a:rPr lang="da-DK" dirty="0"/>
-              <a:t>---</a:t>
-            </a:r>
-          </a:p>
-          <a:p>
-            <a:endParaRPr lang="da-DK" dirty="0"/>
-          </a:p>
-          <a:p>
-            <a:endParaRPr lang="da-DK" dirty="0"/>
-          </a:p>
-          <a:p>
+              <a:t> </a:t>
+            </a:r>
+          </a:p>
+          <a:p>
+            <a:pPr marL="0" indent="0">
+              <a:buNone/>
+            </a:pPr>
             <a:endParaRPr lang="da-DK" dirty="0"/>
           </a:p>
         </p:txBody>
@@ -4186,6 +4196,412 @@
           </a:fontRef>
         </p:style>
       </p:cxnSp>
+      <p:sp>
+        <p:nvSpPr>
+          <p:cNvPr id="10" name="Content Placeholder 2">
+            <a:extLst>
+              <a:ext uri="{FF2B5EF4-FFF2-40B4-BE49-F238E27FC236}">
+                <a16:creationId xmlns:a16="http://schemas.microsoft.com/office/drawing/2014/main" id="{1291270D-F459-5440-95DC-E7BB2B36AAA5}"/>
+              </a:ext>
+            </a:extLst>
+          </p:cNvPr>
+          <p:cNvSpPr txBox="1">
+            <a:spLocks/>
+          </p:cNvSpPr>
+          <p:nvPr/>
+        </p:nvSpPr>
+        <p:spPr>
+          <a:xfrm>
+            <a:off x="3904636" y="3557448"/>
+            <a:ext cx="4381500" cy="2837392"/>
+          </a:xfrm>
+          <a:prstGeom prst="rect">
+            <a:avLst/>
+          </a:prstGeom>
+        </p:spPr>
+        <p:txBody>
+          <a:bodyPr vert="horz" lIns="91440" tIns="45720" rIns="91440" bIns="45720" rtlCol="0">
+            <a:noAutofit/>
+          </a:bodyPr>
+          <a:lstStyle>
+            <a:lvl1pPr marL="228600" indent="-228600" algn="l" defTabSz="914400" rtl="0" eaLnBrk="1" latinLnBrk="0" hangingPunct="1">
+              <a:lnSpc>
+                <a:spcPct val="90000"/>
+              </a:lnSpc>
+              <a:spcBef>
+                <a:spcPts val="1000"/>
+              </a:spcBef>
+              <a:buFont typeface="Arial" panose="020B0604020202020204" pitchFamily="34" charset="0"/>
+              <a:buChar char="•"/>
+              <a:defRPr sz="2800" kern="1200">
+                <a:solidFill>
+                  <a:schemeClr val="tx1"/>
+                </a:solidFill>
+                <a:latin typeface="+mn-lt"/>
+                <a:ea typeface="+mn-ea"/>
+                <a:cs typeface="+mn-cs"/>
+              </a:defRPr>
+            </a:lvl1pPr>
+            <a:lvl2pPr marL="685800" indent="-228600" algn="l" defTabSz="914400" rtl="0" eaLnBrk="1" latinLnBrk="0" hangingPunct="1">
+              <a:lnSpc>
+                <a:spcPct val="90000"/>
+              </a:lnSpc>
+              <a:spcBef>
+                <a:spcPts val="500"/>
+              </a:spcBef>
+              <a:buFont typeface="Arial" panose="020B0604020202020204" pitchFamily="34" charset="0"/>
+              <a:buChar char="•"/>
+              <a:defRPr sz="2400" kern="1200">
+                <a:solidFill>
+                  <a:schemeClr val="tx1"/>
+                </a:solidFill>
+                <a:latin typeface="+mn-lt"/>
+                <a:ea typeface="+mn-ea"/>
+                <a:cs typeface="+mn-cs"/>
+              </a:defRPr>
+            </a:lvl2pPr>
+            <a:lvl3pPr marL="1143000" indent="-228600" algn="l" defTabSz="914400" rtl="0" eaLnBrk="1" latinLnBrk="0" hangingPunct="1">
+              <a:lnSpc>
+                <a:spcPct val="90000"/>
+              </a:lnSpc>
+              <a:spcBef>
+                <a:spcPts val="500"/>
+              </a:spcBef>
+              <a:buFont typeface="Arial" panose="020B0604020202020204" pitchFamily="34" charset="0"/>
+              <a:buChar char="•"/>
+              <a:defRPr sz="2000" kern="1200">
+                <a:solidFill>
+                  <a:schemeClr val="tx1"/>
+                </a:solidFill>
+                <a:latin typeface="+mn-lt"/>
+                <a:ea typeface="+mn-ea"/>
+                <a:cs typeface="+mn-cs"/>
+              </a:defRPr>
+            </a:lvl3pPr>
+            <a:lvl4pPr marL="1600200" indent="-228600" algn="l" defTabSz="914400" rtl="0" eaLnBrk="1" latinLnBrk="0" hangingPunct="1">
+              <a:lnSpc>
+                <a:spcPct val="90000"/>
+              </a:lnSpc>
+              <a:spcBef>
+                <a:spcPts val="500"/>
+              </a:spcBef>
+              <a:buFont typeface="Arial" panose="020B0604020202020204" pitchFamily="34" charset="0"/>
+              <a:buChar char="•"/>
+              <a:defRPr sz="1800" kern="1200">
+                <a:solidFill>
+                  <a:schemeClr val="tx1"/>
+                </a:solidFill>
+                <a:latin typeface="+mn-lt"/>
+                <a:ea typeface="+mn-ea"/>
+                <a:cs typeface="+mn-cs"/>
+              </a:defRPr>
+            </a:lvl4pPr>
+            <a:lvl5pPr marL="2057400" indent="-228600" algn="l" defTabSz="914400" rtl="0" eaLnBrk="1" latinLnBrk="0" hangingPunct="1">
+              <a:lnSpc>
+                <a:spcPct val="90000"/>
+              </a:lnSpc>
+              <a:spcBef>
+                <a:spcPts val="500"/>
+              </a:spcBef>
+              <a:buFont typeface="Arial" panose="020B0604020202020204" pitchFamily="34" charset="0"/>
+              <a:buChar char="•"/>
+              <a:defRPr sz="1800" kern="1200">
+                <a:solidFill>
+                  <a:schemeClr val="tx1"/>
+                </a:solidFill>
+                <a:latin typeface="+mn-lt"/>
+                <a:ea typeface="+mn-ea"/>
+                <a:cs typeface="+mn-cs"/>
+              </a:defRPr>
+            </a:lvl5pPr>
+            <a:lvl6pPr marL="2514600" indent="-228600" algn="l" defTabSz="914400" rtl="0" eaLnBrk="1" latinLnBrk="0" hangingPunct="1">
+              <a:lnSpc>
+                <a:spcPct val="90000"/>
+              </a:lnSpc>
+              <a:spcBef>
+                <a:spcPts val="500"/>
+              </a:spcBef>
+              <a:buFont typeface="Arial" panose="020B0604020202020204" pitchFamily="34" charset="0"/>
+              <a:buChar char="•"/>
+              <a:defRPr sz="1800" kern="1200">
+                <a:solidFill>
+                  <a:schemeClr val="tx1"/>
+                </a:solidFill>
+                <a:latin typeface="+mn-lt"/>
+                <a:ea typeface="+mn-ea"/>
+                <a:cs typeface="+mn-cs"/>
+              </a:defRPr>
+            </a:lvl6pPr>
+            <a:lvl7pPr marL="2971800" indent="-228600" algn="l" defTabSz="914400" rtl="0" eaLnBrk="1" latinLnBrk="0" hangingPunct="1">
+              <a:lnSpc>
+                <a:spcPct val="90000"/>
+              </a:lnSpc>
+              <a:spcBef>
+                <a:spcPts val="500"/>
+              </a:spcBef>
+              <a:buFont typeface="Arial" panose="020B0604020202020204" pitchFamily="34" charset="0"/>
+              <a:buChar char="•"/>
+              <a:defRPr sz="1800" kern="1200">
+                <a:solidFill>
+                  <a:schemeClr val="tx1"/>
+                </a:solidFill>
+                <a:latin typeface="+mn-lt"/>
+                <a:ea typeface="+mn-ea"/>
+                <a:cs typeface="+mn-cs"/>
+              </a:defRPr>
+            </a:lvl7pPr>
+            <a:lvl8pPr marL="3429000" indent="-228600" algn="l" defTabSz="914400" rtl="0" eaLnBrk="1" latinLnBrk="0" hangingPunct="1">
+              <a:lnSpc>
+                <a:spcPct val="90000"/>
+              </a:lnSpc>
+              <a:spcBef>
+                <a:spcPts val="500"/>
+              </a:spcBef>
+              <a:buFont typeface="Arial" panose="020B0604020202020204" pitchFamily="34" charset="0"/>
+              <a:buChar char="•"/>
+              <a:defRPr sz="1800" kern="1200">
+                <a:solidFill>
+                  <a:schemeClr val="tx1"/>
+                </a:solidFill>
+                <a:latin typeface="+mn-lt"/>
+                <a:ea typeface="+mn-ea"/>
+                <a:cs typeface="+mn-cs"/>
+              </a:defRPr>
+            </a:lvl8pPr>
+            <a:lvl9pPr marL="3886200" indent="-228600" algn="l" defTabSz="914400" rtl="0" eaLnBrk="1" latinLnBrk="0" hangingPunct="1">
+              <a:lnSpc>
+                <a:spcPct val="90000"/>
+              </a:lnSpc>
+              <a:spcBef>
+                <a:spcPts val="500"/>
+              </a:spcBef>
+              <a:buFont typeface="Arial" panose="020B0604020202020204" pitchFamily="34" charset="0"/>
+              <a:buChar char="•"/>
+              <a:defRPr sz="1800" kern="1200">
+                <a:solidFill>
+                  <a:schemeClr val="tx1"/>
+                </a:solidFill>
+                <a:latin typeface="+mn-lt"/>
+                <a:ea typeface="+mn-ea"/>
+                <a:cs typeface="+mn-cs"/>
+              </a:defRPr>
+            </a:lvl9pPr>
+          </a:lstStyle>
+          <a:p>
+            <a:pPr marL="0" indent="0">
+              <a:lnSpc>
+                <a:spcPct val="100000"/>
+              </a:lnSpc>
+              <a:buNone/>
+            </a:pPr>
+            <a:r>
+              <a:rPr lang="en-GB" sz="1600" dirty="0">
+                <a:latin typeface="DejaVu Sans Book" panose="020B0603030804020204" pitchFamily="34" charset="0"/>
+                <a:ea typeface="DejaVu Sans Book" panose="020B0603030804020204" pitchFamily="34" charset="0"/>
+                <a:cs typeface="DejaVu Sans Book" panose="020B0603030804020204" pitchFamily="34" charset="0"/>
+              </a:rPr>
+              <a:t>let fib N =</a:t>
+            </a:r>
+          </a:p>
+          <a:p>
+            <a:pPr marL="0" indent="0">
+              <a:lnSpc>
+                <a:spcPct val="100000"/>
+              </a:lnSpc>
+              <a:buNone/>
+            </a:pPr>
+            <a:r>
+              <a:rPr lang="en-GB" sz="1600" dirty="0">
+                <a:latin typeface="DejaVu Sans Book" panose="020B0603030804020204" pitchFamily="34" charset="0"/>
+                <a:ea typeface="DejaVu Sans Book" panose="020B0603030804020204" pitchFamily="34" charset="0"/>
+                <a:cs typeface="DejaVu Sans Book" panose="020B0603030804020204" pitchFamily="34" charset="0"/>
+              </a:rPr>
+              <a:t>  let mutable pair = (1,1)</a:t>
+            </a:r>
+          </a:p>
+          <a:p>
+            <a:pPr marL="0" indent="0">
+              <a:lnSpc>
+                <a:spcPct val="100000"/>
+              </a:lnSpc>
+              <a:buNone/>
+            </a:pPr>
+            <a:r>
+              <a:rPr lang="en-GB" sz="1600" dirty="0">
+                <a:latin typeface="DejaVu Sans Book" panose="020B0603030804020204" pitchFamily="34" charset="0"/>
+                <a:ea typeface="DejaVu Sans Book" panose="020B0603030804020204" pitchFamily="34" charset="0"/>
+                <a:cs typeface="DejaVu Sans Book" panose="020B0603030804020204" pitchFamily="34" charset="0"/>
+              </a:rPr>
+              <a:t>  for </a:t>
+            </a:r>
+            <a:r>
+              <a:rPr lang="en-GB" sz="1600" dirty="0" err="1">
+                <a:latin typeface="DejaVu Sans Book" panose="020B0603030804020204" pitchFamily="34" charset="0"/>
+                <a:ea typeface="DejaVu Sans Book" panose="020B0603030804020204" pitchFamily="34" charset="0"/>
+                <a:cs typeface="DejaVu Sans Book" panose="020B0603030804020204" pitchFamily="34" charset="0"/>
+              </a:rPr>
+              <a:t>i</a:t>
+            </a:r>
+            <a:r>
+              <a:rPr lang="en-GB" sz="1600" dirty="0">
+                <a:latin typeface="DejaVu Sans Book" panose="020B0603030804020204" pitchFamily="34" charset="0"/>
+                <a:ea typeface="DejaVu Sans Book" panose="020B0603030804020204" pitchFamily="34" charset="0"/>
+                <a:cs typeface="DejaVu Sans Book" panose="020B0603030804020204" pitchFamily="34" charset="0"/>
+              </a:rPr>
+              <a:t> = 3 to N do</a:t>
+            </a:r>
+          </a:p>
+          <a:p>
+            <a:pPr marL="0" indent="0">
+              <a:lnSpc>
+                <a:spcPct val="100000"/>
+              </a:lnSpc>
+              <a:buNone/>
+            </a:pPr>
+            <a:r>
+              <a:rPr lang="en-GB" sz="1600" dirty="0">
+                <a:latin typeface="DejaVu Sans Book" panose="020B0603030804020204" pitchFamily="34" charset="0"/>
+                <a:ea typeface="DejaVu Sans Book" panose="020B0603030804020204" pitchFamily="34" charset="0"/>
+                <a:cs typeface="DejaVu Sans Book" panose="020B0603030804020204" pitchFamily="34" charset="0"/>
+              </a:rPr>
+              <a:t>    pair &lt;- (</a:t>
+            </a:r>
+            <a:r>
+              <a:rPr lang="en-GB" sz="1600" dirty="0" err="1">
+                <a:latin typeface="DejaVu Sans Book" panose="020B0603030804020204" pitchFamily="34" charset="0"/>
+                <a:ea typeface="DejaVu Sans Book" panose="020B0603030804020204" pitchFamily="34" charset="0"/>
+                <a:cs typeface="DejaVu Sans Book" panose="020B0603030804020204" pitchFamily="34" charset="0"/>
+              </a:rPr>
+              <a:t>snd</a:t>
+            </a:r>
+            <a:r>
+              <a:rPr lang="en-GB" sz="1600" dirty="0">
+                <a:latin typeface="DejaVu Sans Book" panose="020B0603030804020204" pitchFamily="34" charset="0"/>
+                <a:ea typeface="DejaVu Sans Book" panose="020B0603030804020204" pitchFamily="34" charset="0"/>
+                <a:cs typeface="DejaVu Sans Book" panose="020B0603030804020204" pitchFamily="34" charset="0"/>
+              </a:rPr>
+              <a:t> pair, </a:t>
+            </a:r>
+            <a:r>
+              <a:rPr lang="en-GB" sz="1600" dirty="0" err="1">
+                <a:latin typeface="DejaVu Sans Book" panose="020B0603030804020204" pitchFamily="34" charset="0"/>
+                <a:ea typeface="DejaVu Sans Book" panose="020B0603030804020204" pitchFamily="34" charset="0"/>
+                <a:cs typeface="DejaVu Sans Book" panose="020B0603030804020204" pitchFamily="34" charset="0"/>
+              </a:rPr>
+              <a:t>fst</a:t>
+            </a:r>
+            <a:r>
+              <a:rPr lang="en-GB" sz="1600" dirty="0">
+                <a:latin typeface="DejaVu Sans Book" panose="020B0603030804020204" pitchFamily="34" charset="0"/>
+                <a:ea typeface="DejaVu Sans Book" panose="020B0603030804020204" pitchFamily="34" charset="0"/>
+                <a:cs typeface="DejaVu Sans Book" panose="020B0603030804020204" pitchFamily="34" charset="0"/>
+              </a:rPr>
+              <a:t> pair + </a:t>
+            </a:r>
+            <a:r>
+              <a:rPr lang="en-GB" sz="1600" dirty="0" err="1">
+                <a:latin typeface="DejaVu Sans Book" panose="020B0603030804020204" pitchFamily="34" charset="0"/>
+                <a:ea typeface="DejaVu Sans Book" panose="020B0603030804020204" pitchFamily="34" charset="0"/>
+                <a:cs typeface="DejaVu Sans Book" panose="020B0603030804020204" pitchFamily="34" charset="0"/>
+              </a:rPr>
+              <a:t>snd</a:t>
+            </a:r>
+            <a:r>
+              <a:rPr lang="en-GB" sz="1600" dirty="0">
+                <a:latin typeface="DejaVu Sans Book" panose="020B0603030804020204" pitchFamily="34" charset="0"/>
+                <a:ea typeface="DejaVu Sans Book" panose="020B0603030804020204" pitchFamily="34" charset="0"/>
+                <a:cs typeface="DejaVu Sans Book" panose="020B0603030804020204" pitchFamily="34" charset="0"/>
+              </a:rPr>
+              <a:t> pair)</a:t>
+            </a:r>
+          </a:p>
+          <a:p>
+            <a:pPr marL="0" indent="0">
+              <a:lnSpc>
+                <a:spcPct val="100000"/>
+              </a:lnSpc>
+              <a:buNone/>
+            </a:pPr>
+            <a:r>
+              <a:rPr lang="en-GB" sz="1600" dirty="0">
+                <a:latin typeface="DejaVu Sans Book" panose="020B0603030804020204" pitchFamily="34" charset="0"/>
+                <a:ea typeface="DejaVu Sans Book" panose="020B0603030804020204" pitchFamily="34" charset="0"/>
+                <a:cs typeface="DejaVu Sans Book" panose="020B0603030804020204" pitchFamily="34" charset="0"/>
+              </a:rPr>
+              <a:t>  </a:t>
+            </a:r>
+            <a:r>
+              <a:rPr lang="en-GB" sz="1600" dirty="0" err="1">
+                <a:latin typeface="DejaVu Sans Book" panose="020B0603030804020204" pitchFamily="34" charset="0"/>
+                <a:ea typeface="DejaVu Sans Book" panose="020B0603030804020204" pitchFamily="34" charset="0"/>
+                <a:cs typeface="DejaVu Sans Book" panose="020B0603030804020204" pitchFamily="34" charset="0"/>
+              </a:rPr>
+              <a:t>snd</a:t>
+            </a:r>
+            <a:r>
+              <a:rPr lang="en-GB" sz="1600" dirty="0">
+                <a:latin typeface="DejaVu Sans Book" panose="020B0603030804020204" pitchFamily="34" charset="0"/>
+                <a:ea typeface="DejaVu Sans Book" panose="020B0603030804020204" pitchFamily="34" charset="0"/>
+                <a:cs typeface="DejaVu Sans Book" panose="020B0603030804020204" pitchFamily="34" charset="0"/>
+              </a:rPr>
+              <a:t> pair</a:t>
+            </a:r>
+          </a:p>
+          <a:p>
+            <a:pPr marL="0" indent="0">
+              <a:lnSpc>
+                <a:spcPct val="100000"/>
+              </a:lnSpc>
+              <a:buNone/>
+            </a:pPr>
+            <a:endParaRPr lang="en-GB" sz="1600" dirty="0">
+              <a:latin typeface="DejaVu Sans Book" panose="020B0603030804020204" pitchFamily="34" charset="0"/>
+              <a:ea typeface="DejaVu Sans Book" panose="020B0603030804020204" pitchFamily="34" charset="0"/>
+              <a:cs typeface="DejaVu Sans Book" panose="020B0603030804020204" pitchFamily="34" charset="0"/>
+            </a:endParaRPr>
+          </a:p>
+          <a:p>
+            <a:pPr marL="0" indent="0">
+              <a:lnSpc>
+                <a:spcPct val="100000"/>
+              </a:lnSpc>
+              <a:buNone/>
+            </a:pPr>
+            <a:r>
+              <a:rPr lang="en-GB" sz="1600" dirty="0">
+                <a:latin typeface="DejaVu Sans Book" panose="020B0603030804020204" pitchFamily="34" charset="0"/>
+                <a:ea typeface="DejaVu Sans Book" panose="020B0603030804020204" pitchFamily="34" charset="0"/>
+                <a:cs typeface="DejaVu Sans Book" panose="020B0603030804020204" pitchFamily="34" charset="0"/>
+              </a:rPr>
+              <a:t>let N = 5</a:t>
+            </a:r>
+          </a:p>
+          <a:p>
+            <a:pPr marL="0" indent="0">
+              <a:lnSpc>
+                <a:spcPct val="100000"/>
+              </a:lnSpc>
+              <a:buNone/>
+            </a:pPr>
+            <a:r>
+              <a:rPr lang="en-GB" sz="1600" dirty="0" err="1">
+                <a:latin typeface="DejaVu Sans Book" panose="020B0603030804020204" pitchFamily="34" charset="0"/>
+                <a:ea typeface="DejaVu Sans Book" panose="020B0603030804020204" pitchFamily="34" charset="0"/>
+                <a:cs typeface="DejaVu Sans Book" panose="020B0603030804020204" pitchFamily="34" charset="0"/>
+              </a:rPr>
+              <a:t>printfn</a:t>
+            </a:r>
+            <a:r>
+              <a:rPr lang="en-GB" sz="1600" dirty="0">
+                <a:latin typeface="DejaVu Sans Book" panose="020B0603030804020204" pitchFamily="34" charset="0"/>
+                <a:ea typeface="DejaVu Sans Book" panose="020B0603030804020204" pitchFamily="34" charset="0"/>
+                <a:cs typeface="DejaVu Sans Book" panose="020B0603030804020204" pitchFamily="34" charset="0"/>
+              </a:rPr>
+              <a:t> "%d: %d" N (fib N)</a:t>
+            </a:r>
+          </a:p>
+        </p:txBody>
+      </p:sp>
     </p:spTree>
     <p:extLst>
       <p:ext uri="{BB962C8B-B14F-4D97-AF65-F5344CB8AC3E}">
@@ -4196,6 +4612,87 @@
   <p:clrMapOvr>
     <a:masterClrMapping/>
   </p:clrMapOvr>
+  <p:timing>
+    <p:tnLst>
+      <p:par>
+        <p:cTn id="1" dur="indefinite" restart="never" nodeType="tmRoot">
+          <p:childTnLst>
+            <p:seq concurrent="1" nextAc="seek">
+              <p:cTn id="2" dur="indefinite" nodeType="mainSeq">
+                <p:childTnLst>
+                  <p:par>
+                    <p:cTn id="3" fill="hold">
+                      <p:stCondLst>
+                        <p:cond delay="indefinite"/>
+                        <p:cond evt="onBegin" delay="0">
+                          <p:tn val="2"/>
+                        </p:cond>
+                      </p:stCondLst>
+                      <p:childTnLst>
+                        <p:par>
+                          <p:cTn id="4" fill="hold">
+                            <p:stCondLst>
+                              <p:cond delay="0"/>
+                            </p:stCondLst>
+                            <p:childTnLst>
+                              <p:par>
+                                <p:cTn id="5" presetID="1" presetClass="entr" presetSubtype="0" fill="hold" grpId="0" nodeType="withEffect">
+                                  <p:stCondLst>
+                                    <p:cond delay="0"/>
+                                  </p:stCondLst>
+                                  <p:childTnLst>
+                                    <p:set>
+                                      <p:cBhvr>
+                                        <p:cTn id="6" dur="1" fill="hold">
+                                          <p:stCondLst>
+                                            <p:cond delay="0"/>
+                                          </p:stCondLst>
+                                        </p:cTn>
+                                        <p:tgtEl>
+                                          <p:spTgt spid="10"/>
+                                        </p:tgtEl>
+                                        <p:attrNameLst>
+                                          <p:attrName>style.visibility</p:attrName>
+                                        </p:attrNameLst>
+                                      </p:cBhvr>
+                                      <p:to>
+                                        <p:strVal val="visible"/>
+                                      </p:to>
+                                    </p:set>
+                                  </p:childTnLst>
+                                </p:cTn>
+                              </p:par>
+                            </p:childTnLst>
+                          </p:cTn>
+                        </p:par>
+                      </p:childTnLst>
+                    </p:cTn>
+                  </p:par>
+                </p:childTnLst>
+              </p:cTn>
+              <p:prevCondLst>
+                <p:cond evt="onPrev" delay="0">
+                  <p:tgtEl>
+                    <p:sldTgt/>
+                  </p:tgtEl>
+                </p:cond>
+              </p:prevCondLst>
+              <p:nextCondLst>
+                <p:cond evt="onNext" delay="0">
+                  <p:tgtEl>
+                    <p:sldTgt/>
+                  </p:tgtEl>
+                </p:cond>
+              </p:nextCondLst>
+            </p:seq>
+          </p:childTnLst>
+        </p:cTn>
+      </p:par>
+    </p:tnLst>
+    <p:bldLst>
+      <p:bldP spid="10" grpId="0"/>
+    </p:bldLst>
+  </p:timing>
 </p:sld>
 </file>
 
@@ -4232,91 +4729,282 @@
             <p:ph type="title"/>
           </p:nvPr>
         </p:nvSpPr>
-        <p:spPr/>
-        <p:txBody>
-          <a:bodyPr/>
+        <p:spPr>
+          <a:xfrm>
+            <a:off x="838200" y="365127"/>
+            <a:ext cx="10515600" cy="777873"/>
+          </a:xfrm>
+        </p:spPr>
+        <p:txBody>
+          <a:bodyPr>
+            <a:normAutofit/>
+          </a:bodyPr>
           <a:lstStyle/>
           <a:p>
-            <a:endParaRPr lang="en-GB"/>
-          </a:p>
-        </p:txBody>
-      </p:sp>
-      <p:sp>
-        <p:nvSpPr>
-          <p:cNvPr id="3" name="Content Placeholder 2">
-            <a:extLst>
-              <a:ext uri="{FF2B5EF4-FFF2-40B4-BE49-F238E27FC236}">
-                <a16:creationId xmlns:a16="http://schemas.microsoft.com/office/drawing/2014/main" id="{780DBFCA-88B1-6944-BB16-96D35D684A87}"/>
-              </a:ext>
-            </a:extLst>
-          </p:cNvPr>
-          <p:cNvSpPr>
-            <a:spLocks noGrp="1"/>
-          </p:cNvSpPr>
-          <p:nvPr>
-            <p:ph idx="1"/>
-          </p:nvPr>
-        </p:nvSpPr>
-        <p:spPr/>
-        <p:txBody>
-          <a:bodyPr/>
+            <a:r>
+              <a:rPr lang="da-DK" dirty="0"/>
+              <a:t>Kald-stakken (værdier og variable) </a:t>
+            </a:r>
+            <a:endParaRPr lang="en-GB" dirty="0"/>
+          </a:p>
+        </p:txBody>
+      </p:sp>
+      <p:pic>
+        <p:nvPicPr>
+          <p:cNvPr id="5" name="Picture 4">
+            <a:extLst>
+              <a:ext uri="{FF2B5EF4-FFF2-40B4-BE49-F238E27FC236}">
+                <a16:creationId xmlns:a16="http://schemas.microsoft.com/office/drawing/2014/main" id="{B1D7B79A-CDAD-5648-A6D4-C613BE3AF3DC}"/>
+              </a:ext>
+            </a:extLst>
+          </p:cNvPr>
+          <p:cNvPicPr>
+            <a:picLocks noChangeAspect="1"/>
+          </p:cNvPicPr>
+          <p:nvPr/>
+        </p:nvPicPr>
+        <p:blipFill>
+          <a:blip r:embed="rId2"/>
+          <a:stretch>
+            <a:fillRect/>
+          </a:stretch>
+        </p:blipFill>
+        <p:spPr>
+          <a:xfrm>
+            <a:off x="1143000" y="1759223"/>
+            <a:ext cx="3429000" cy="2571750"/>
+          </a:xfrm>
+          <a:prstGeom prst="rect">
+            <a:avLst/>
+          </a:prstGeom>
+        </p:spPr>
+      </p:pic>
+      <p:sp>
+        <p:nvSpPr>
+          <p:cNvPr id="8" name="TextBox 7">
+            <a:extLst>
+              <a:ext uri="{FF2B5EF4-FFF2-40B4-BE49-F238E27FC236}">
+                <a16:creationId xmlns:a16="http://schemas.microsoft.com/office/drawing/2014/main" id="{ABBAEF74-3F59-C949-BC61-12AA897B75F9}"/>
+              </a:ext>
+            </a:extLst>
+          </p:cNvPr>
+          <p:cNvSpPr txBox="1"/>
+          <p:nvPr/>
+        </p:nvSpPr>
+        <p:spPr>
+          <a:xfrm>
+            <a:off x="1143000" y="1094065"/>
+            <a:ext cx="2672655" cy="461665"/>
+          </a:xfrm>
+          <a:prstGeom prst="rect">
+            <a:avLst/>
+          </a:prstGeom>
+          <a:noFill/>
+        </p:spPr>
+        <p:txBody>
+          <a:bodyPr wrap="none" rtlCol="0">
+            <a:spAutoFit/>
+          </a:bodyPr>
           <a:lstStyle/>
           <a:p>
             <a:r>
-              <a:rPr lang="en-GB" dirty="0" err="1"/>
-              <a:t>Muterbare</a:t>
-            </a:r>
-            <a:r>
-              <a:rPr lang="en-GB" dirty="0"/>
-              <a:t> </a:t>
-            </a:r>
-            <a:r>
-              <a:rPr lang="en-GB" dirty="0" err="1"/>
-              <a:t>værdier</a:t>
-            </a:r>
-            <a:r>
-              <a:rPr lang="en-GB" dirty="0"/>
-              <a:t> </a:t>
-            </a:r>
-            <a:r>
-              <a:rPr lang="en-GB" dirty="0" err="1"/>
-              <a:t>værdi-kopieres</a:t>
-            </a:r>
-            <a:r>
-              <a:rPr lang="en-GB" dirty="0"/>
-              <a:t> </a:t>
-            </a:r>
-          </a:p>
-          <a:p>
-            <a:r>
-              <a:rPr lang="en-GB" dirty="0"/>
-              <a:t>Reference </a:t>
-            </a:r>
-            <a:r>
-              <a:rPr lang="en-GB" dirty="0" err="1"/>
-              <a:t>celler</a:t>
-            </a:r>
-            <a:r>
-              <a:rPr lang="en-GB" dirty="0"/>
-              <a:t> </a:t>
-            </a:r>
-            <a:r>
-              <a:rPr lang="en-GB" dirty="0" err="1"/>
-              <a:t>og</a:t>
-            </a:r>
-            <a:r>
-              <a:rPr lang="en-GB" dirty="0"/>
-              <a:t> aliasing</a:t>
-            </a:r>
-          </a:p>
-          <a:p>
-            <a:pPr marL="0" indent="0">
-              <a:buNone/>
-            </a:pPr>
-            <a:endParaRPr lang="en-GB" dirty="0"/>
-          </a:p>
-        </p:txBody>
-      </p:sp>
+              <a:rPr lang="da-DK" sz="2400" dirty="0"/>
+              <a:t>Stakken (The </a:t>
+            </a:r>
+            <a:r>
+              <a:rPr lang="da-DK" sz="2400" dirty="0" err="1"/>
+              <a:t>Stack</a:t>
+            </a:r>
+            <a:r>
+              <a:rPr lang="da-DK" sz="2400" dirty="0"/>
+              <a:t>) </a:t>
+            </a:r>
+            <a:endParaRPr lang="da-DK" sz="2400" dirty="0">
+              <a:effectLst/>
+            </a:endParaRPr>
+          </a:p>
+        </p:txBody>
+      </p:sp>
+      <p:pic>
+        <p:nvPicPr>
+          <p:cNvPr id="11" name="Picture 10">
+            <a:extLst>
+              <a:ext uri="{FF2B5EF4-FFF2-40B4-BE49-F238E27FC236}">
+                <a16:creationId xmlns:a16="http://schemas.microsoft.com/office/drawing/2014/main" id="{FE51C83D-5967-8D4F-A67F-2B8E4F6B010D}"/>
+              </a:ext>
+            </a:extLst>
+          </p:cNvPr>
+          <p:cNvPicPr>
+            <a:picLocks noChangeAspect="1"/>
+          </p:cNvPicPr>
+          <p:nvPr/>
+        </p:nvPicPr>
+        <p:blipFill>
+          <a:blip r:embed="rId3"/>
+          <a:stretch>
+            <a:fillRect/>
+          </a:stretch>
+        </p:blipFill>
+        <p:spPr>
+          <a:xfrm>
+            <a:off x="7785835" y="1431697"/>
+            <a:ext cx="2425700" cy="2273300"/>
+          </a:xfrm>
+          <a:prstGeom prst="rect">
+            <a:avLst/>
+          </a:prstGeom>
+        </p:spPr>
+      </p:pic>
+      <p:pic>
+        <p:nvPicPr>
+          <p:cNvPr id="13" name="Picture 12">
+            <a:extLst>
+              <a:ext uri="{FF2B5EF4-FFF2-40B4-BE49-F238E27FC236}">
+                <a16:creationId xmlns:a16="http://schemas.microsoft.com/office/drawing/2014/main" id="{A9D2082E-F89A-2F40-A3FB-566D473100E4}"/>
+              </a:ext>
+            </a:extLst>
+          </p:cNvPr>
+          <p:cNvPicPr>
+            <a:picLocks noChangeAspect="1"/>
+          </p:cNvPicPr>
+          <p:nvPr/>
+        </p:nvPicPr>
+        <p:blipFill>
+          <a:blip r:embed="rId4"/>
+          <a:stretch>
+            <a:fillRect/>
+          </a:stretch>
+        </p:blipFill>
+        <p:spPr>
+          <a:xfrm>
+            <a:off x="203200" y="5791200"/>
+            <a:ext cx="2197100" cy="762000"/>
+          </a:xfrm>
+          <a:prstGeom prst="rect">
+            <a:avLst/>
+          </a:prstGeom>
+        </p:spPr>
+      </p:pic>
+      <p:pic>
+        <p:nvPicPr>
+          <p:cNvPr id="15" name="Picture 14">
+            <a:extLst>
+              <a:ext uri="{FF2B5EF4-FFF2-40B4-BE49-F238E27FC236}">
+                <a16:creationId xmlns:a16="http://schemas.microsoft.com/office/drawing/2014/main" id="{BEE05015-F23A-284A-8610-00D2A4BEE842}"/>
+              </a:ext>
+            </a:extLst>
+          </p:cNvPr>
+          <p:cNvPicPr>
+            <a:picLocks noChangeAspect="1"/>
+          </p:cNvPicPr>
+          <p:nvPr/>
+        </p:nvPicPr>
+        <p:blipFill>
+          <a:blip r:embed="rId5"/>
+          <a:stretch>
+            <a:fillRect/>
+          </a:stretch>
+        </p:blipFill>
+        <p:spPr>
+          <a:xfrm>
+            <a:off x="2613025" y="4864100"/>
+            <a:ext cx="2197100" cy="1689100"/>
+          </a:xfrm>
+          <a:prstGeom prst="rect">
+            <a:avLst/>
+          </a:prstGeom>
+        </p:spPr>
+      </p:pic>
+      <p:pic>
+        <p:nvPicPr>
+          <p:cNvPr id="17" name="Picture 16">
+            <a:extLst>
+              <a:ext uri="{FF2B5EF4-FFF2-40B4-BE49-F238E27FC236}">
+                <a16:creationId xmlns:a16="http://schemas.microsoft.com/office/drawing/2014/main" id="{C7F19E61-256E-AE4A-943D-23CE27C8FA43}"/>
+              </a:ext>
+            </a:extLst>
+          </p:cNvPr>
+          <p:cNvPicPr>
+            <a:picLocks noChangeAspect="1"/>
+          </p:cNvPicPr>
+          <p:nvPr/>
+        </p:nvPicPr>
+        <p:blipFill>
+          <a:blip r:embed="rId6"/>
+          <a:stretch>
+            <a:fillRect/>
+          </a:stretch>
+        </p:blipFill>
+        <p:spPr>
+          <a:xfrm>
+            <a:off x="5022850" y="3819662"/>
+            <a:ext cx="2171700" cy="2692400"/>
+          </a:xfrm>
+          <a:prstGeom prst="rect">
+            <a:avLst/>
+          </a:prstGeom>
+        </p:spPr>
+      </p:pic>
+      <p:pic>
+        <p:nvPicPr>
+          <p:cNvPr id="19" name="Picture 18">
+            <a:extLst>
+              <a:ext uri="{FF2B5EF4-FFF2-40B4-BE49-F238E27FC236}">
+                <a16:creationId xmlns:a16="http://schemas.microsoft.com/office/drawing/2014/main" id="{9E6119C6-8C70-5345-85D5-0E2A14DA30AF}"/>
+              </a:ext>
+            </a:extLst>
+          </p:cNvPr>
+          <p:cNvPicPr>
+            <a:picLocks noChangeAspect="1"/>
+          </p:cNvPicPr>
+          <p:nvPr/>
+        </p:nvPicPr>
+        <p:blipFill>
+          <a:blip r:embed="rId7"/>
+          <a:stretch>
+            <a:fillRect/>
+          </a:stretch>
+        </p:blipFill>
+        <p:spPr>
+          <a:xfrm>
+            <a:off x="7407275" y="4032523"/>
+            <a:ext cx="2184400" cy="2413000"/>
+          </a:xfrm>
+          <a:prstGeom prst="rect">
+            <a:avLst/>
+          </a:prstGeom>
+        </p:spPr>
+      </p:pic>
+      <p:pic>
+        <p:nvPicPr>
+          <p:cNvPr id="21" name="Picture 20">
+            <a:extLst>
+              <a:ext uri="{FF2B5EF4-FFF2-40B4-BE49-F238E27FC236}">
+                <a16:creationId xmlns:a16="http://schemas.microsoft.com/office/drawing/2014/main" id="{DD4CA6C7-3741-7847-950B-2732967776A6}"/>
+              </a:ext>
+            </a:extLst>
+          </p:cNvPr>
+          <p:cNvPicPr>
+            <a:picLocks noChangeAspect="1"/>
+          </p:cNvPicPr>
+          <p:nvPr/>
+        </p:nvPicPr>
+        <p:blipFill>
+          <a:blip r:embed="rId8"/>
+          <a:stretch>
+            <a:fillRect/>
+          </a:stretch>
+        </p:blipFill>
+        <p:spPr>
+          <a:xfrm>
+            <a:off x="9804400" y="5356362"/>
+            <a:ext cx="2171700" cy="1143000"/>
+          </a:xfrm>
+          <a:prstGeom prst="rect">
+            <a:avLst/>
+          </a:prstGeom>
+        </p:spPr>
+      </p:pic>
     </p:spTree>
     <p:extLst>
       <p:ext uri="{BB962C8B-B14F-4D97-AF65-F5344CB8AC3E}">
@@ -4327,10 +5015,1532 @@
   <p:clrMapOvr>
     <a:masterClrMapping/>
   </p:clrMapOvr>
+  <p:timing>
+    <p:tnLst>
+      <p:par>
+        <p:cTn id="1" dur="indefinite" restart="never" nodeType="tmRoot">
+          <p:childTnLst>
+            <p:seq concurrent="1" nextAc="seek">
+              <p:cTn id="2" dur="indefinite" nodeType="mainSeq">
+                <p:childTnLst>
+                  <p:par>
+                    <p:cTn id="3" fill="hold">
+                      <p:stCondLst>
+                        <p:cond delay="indefinite"/>
+                      </p:stCondLst>
+                      <p:childTnLst>
+                        <p:par>
+                          <p:cTn id="4" fill="hold">
+                            <p:stCondLst>
+                              <p:cond delay="0"/>
+                            </p:stCondLst>
+                            <p:childTnLst>
+                              <p:par>
+                                <p:cTn id="5" presetID="1" presetClass="entr" presetSubtype="0" fill="hold" nodeType="clickEffect">
+                                  <p:stCondLst>
+                                    <p:cond delay="0"/>
+                                  </p:stCondLst>
+                                  <p:childTnLst>
+                                    <p:set>
+                                      <p:cBhvr>
+                                        <p:cTn id="6" dur="1" fill="hold">
+                                          <p:stCondLst>
+                                            <p:cond delay="0"/>
+                                          </p:stCondLst>
+                                        </p:cTn>
+                                        <p:tgtEl>
+                                          <p:spTgt spid="15"/>
+                                        </p:tgtEl>
+                                        <p:attrNameLst>
+                                          <p:attrName>style.visibility</p:attrName>
+                                        </p:attrNameLst>
+                                      </p:cBhvr>
+                                      <p:to>
+                                        <p:strVal val="visible"/>
+                                      </p:to>
+                                    </p:set>
+                                  </p:childTnLst>
+                                </p:cTn>
+                              </p:par>
+                            </p:childTnLst>
+                          </p:cTn>
+                        </p:par>
+                      </p:childTnLst>
+                    </p:cTn>
+                  </p:par>
+                  <p:par>
+                    <p:cTn id="7" fill="hold">
+                      <p:stCondLst>
+                        <p:cond delay="indefinite"/>
+                      </p:stCondLst>
+                      <p:childTnLst>
+                        <p:par>
+                          <p:cTn id="8" fill="hold">
+                            <p:stCondLst>
+                              <p:cond delay="0"/>
+                            </p:stCondLst>
+                            <p:childTnLst>
+                              <p:par>
+                                <p:cTn id="9" presetID="1" presetClass="entr" presetSubtype="0" fill="hold" nodeType="clickEffect">
+                                  <p:stCondLst>
+                                    <p:cond delay="0"/>
+                                  </p:stCondLst>
+                                  <p:childTnLst>
+                                    <p:set>
+                                      <p:cBhvr>
+                                        <p:cTn id="10" dur="1" fill="hold">
+                                          <p:stCondLst>
+                                            <p:cond delay="0"/>
+                                          </p:stCondLst>
+                                        </p:cTn>
+                                        <p:tgtEl>
+                                          <p:spTgt spid="17"/>
+                                        </p:tgtEl>
+                                        <p:attrNameLst>
+                                          <p:attrName>style.visibility</p:attrName>
+                                        </p:attrNameLst>
+                                      </p:cBhvr>
+                                      <p:to>
+                                        <p:strVal val="visible"/>
+                                      </p:to>
+                                    </p:set>
+                                  </p:childTnLst>
+                                </p:cTn>
+                              </p:par>
+                            </p:childTnLst>
+                          </p:cTn>
+                        </p:par>
+                      </p:childTnLst>
+                    </p:cTn>
+                  </p:par>
+                  <p:par>
+                    <p:cTn id="11" fill="hold">
+                      <p:stCondLst>
+                        <p:cond delay="indefinite"/>
+                      </p:stCondLst>
+                      <p:childTnLst>
+                        <p:par>
+                          <p:cTn id="12" fill="hold">
+                            <p:stCondLst>
+                              <p:cond delay="0"/>
+                            </p:stCondLst>
+                            <p:childTnLst>
+                              <p:par>
+                                <p:cTn id="13" presetID="1" presetClass="entr" presetSubtype="0" fill="hold" nodeType="clickEffect">
+                                  <p:stCondLst>
+                                    <p:cond delay="0"/>
+                                  </p:stCondLst>
+                                  <p:childTnLst>
+                                    <p:set>
+                                      <p:cBhvr>
+                                        <p:cTn id="14" dur="1" fill="hold">
+                                          <p:stCondLst>
+                                            <p:cond delay="0"/>
+                                          </p:stCondLst>
+                                        </p:cTn>
+                                        <p:tgtEl>
+                                          <p:spTgt spid="19"/>
+                                        </p:tgtEl>
+                                        <p:attrNameLst>
+                                          <p:attrName>style.visibility</p:attrName>
+                                        </p:attrNameLst>
+                                      </p:cBhvr>
+                                      <p:to>
+                                        <p:strVal val="visible"/>
+                                      </p:to>
+                                    </p:set>
+                                  </p:childTnLst>
+                                </p:cTn>
+                              </p:par>
+                            </p:childTnLst>
+                          </p:cTn>
+                        </p:par>
+                      </p:childTnLst>
+                    </p:cTn>
+                  </p:par>
+                  <p:par>
+                    <p:cTn id="15" fill="hold">
+                      <p:stCondLst>
+                        <p:cond delay="indefinite"/>
+                      </p:stCondLst>
+                      <p:childTnLst>
+                        <p:par>
+                          <p:cTn id="16" fill="hold">
+                            <p:stCondLst>
+                              <p:cond delay="0"/>
+                            </p:stCondLst>
+                            <p:childTnLst>
+                              <p:par>
+                                <p:cTn id="17" presetID="1" presetClass="entr" presetSubtype="0" fill="hold" nodeType="clickEffect">
+                                  <p:stCondLst>
+                                    <p:cond delay="0"/>
+                                  </p:stCondLst>
+                                  <p:childTnLst>
+                                    <p:set>
+                                      <p:cBhvr>
+                                        <p:cTn id="18" dur="1" fill="hold">
+                                          <p:stCondLst>
+                                            <p:cond delay="0"/>
+                                          </p:stCondLst>
+                                        </p:cTn>
+                                        <p:tgtEl>
+                                          <p:spTgt spid="21"/>
+                                        </p:tgtEl>
+                                        <p:attrNameLst>
+                                          <p:attrName>style.visibility</p:attrName>
+                                        </p:attrNameLst>
+                                      </p:cBhvr>
+                                      <p:to>
+                                        <p:strVal val="visible"/>
+                                      </p:to>
+                                    </p:set>
+                                  </p:childTnLst>
+                                </p:cTn>
+                              </p:par>
+                            </p:childTnLst>
+                          </p:cTn>
+                        </p:par>
+                      </p:childTnLst>
+                    </p:cTn>
+                  </p:par>
+                </p:childTnLst>
+              </p:cTn>
+              <p:prevCondLst>
+                <p:cond evt="onPrev" delay="0">
+                  <p:tgtEl>
+                    <p:sldTgt/>
+                  </p:tgtEl>
+                </p:cond>
+              </p:prevCondLst>
+              <p:nextCondLst>
+                <p:cond evt="onNext" delay="0">
+                  <p:tgtEl>
+                    <p:sldTgt/>
+                  </p:tgtEl>
+                </p:cond>
+              </p:nextCondLst>
+            </p:seq>
+          </p:childTnLst>
+        </p:cTn>
+      </p:par>
+    </p:tnLst>
+  </p:timing>
 </p:sld>
 </file>
 
 <file path=ppt/slides/slide4.xml><?xml version="1.0" encoding="utf-8"?>
+<p:sld xmlns:a="http://schemas.openxmlformats.org/drawingml/2006/main" xmlns:r="http://schemas.openxmlformats.org/officeDocument/2006/relationships" xmlns:p="http://schemas.openxmlformats.org/presentationml/2006/main">
+  <p:cSld>
+    <p:spTree>
+      <p:nvGrpSpPr>
+        <p:cNvPr id="1" name=""/>
+        <p:cNvGrpSpPr/>
+        <p:nvPr/>
+      </p:nvGrpSpPr>
+      <p:grpSpPr>
+        <a:xfrm>
+          <a:off x="0" y="0"/>
+          <a:ext cx="0" cy="0"/>
+          <a:chOff x="0" y="0"/>
+          <a:chExt cx="0" cy="0"/>
+        </a:xfrm>
+      </p:grpSpPr>
+      <p:sp>
+        <p:nvSpPr>
+          <p:cNvPr id="2" name="Title 1">
+            <a:extLst>
+              <a:ext uri="{FF2B5EF4-FFF2-40B4-BE49-F238E27FC236}">
+                <a16:creationId xmlns:a16="http://schemas.microsoft.com/office/drawing/2014/main" id="{DF7CC6FE-44F2-B248-A6F4-89A7666D0F69}"/>
+              </a:ext>
+            </a:extLst>
+          </p:cNvPr>
+          <p:cNvSpPr>
+            <a:spLocks noGrp="1"/>
+          </p:cNvSpPr>
+          <p:nvPr>
+            <p:ph type="title"/>
+          </p:nvPr>
+        </p:nvSpPr>
+        <p:spPr>
+          <a:xfrm>
+            <a:off x="838200" y="365127"/>
+            <a:ext cx="10515600" cy="777873"/>
+          </a:xfrm>
+        </p:spPr>
+        <p:txBody>
+          <a:bodyPr>
+            <a:normAutofit/>
+          </a:bodyPr>
+          <a:lstStyle/>
+          <a:p>
+            <a:r>
+              <a:rPr lang="da-DK" dirty="0"/>
+              <a:t>Referenceceller</a:t>
+            </a:r>
+            <a:endParaRPr lang="en-GB" dirty="0"/>
+          </a:p>
+        </p:txBody>
+      </p:sp>
+      <p:sp>
+        <p:nvSpPr>
+          <p:cNvPr id="8" name="TextBox 7">
+            <a:extLst>
+              <a:ext uri="{FF2B5EF4-FFF2-40B4-BE49-F238E27FC236}">
+                <a16:creationId xmlns:a16="http://schemas.microsoft.com/office/drawing/2014/main" id="{ABBAEF74-3F59-C949-BC61-12AA897B75F9}"/>
+              </a:ext>
+            </a:extLst>
+          </p:cNvPr>
+          <p:cNvSpPr txBox="1"/>
+          <p:nvPr/>
+        </p:nvSpPr>
+        <p:spPr>
+          <a:xfrm>
+            <a:off x="7996657" y="608184"/>
+            <a:ext cx="2566408" cy="461665"/>
+          </a:xfrm>
+          <a:prstGeom prst="rect">
+            <a:avLst/>
+          </a:prstGeom>
+          <a:noFill/>
+        </p:spPr>
+        <p:txBody>
+          <a:bodyPr wrap="none" rtlCol="0">
+            <a:spAutoFit/>
+          </a:bodyPr>
+          <a:lstStyle/>
+          <a:p>
+            <a:r>
+              <a:rPr lang="da-DK" sz="2400" dirty="0"/>
+              <a:t>Bunken (The </a:t>
+            </a:r>
+            <a:r>
+              <a:rPr lang="da-DK" sz="2400" dirty="0" err="1"/>
+              <a:t>Heap</a:t>
+            </a:r>
+            <a:r>
+              <a:rPr lang="da-DK" sz="2400" dirty="0"/>
+              <a:t>)</a:t>
+            </a:r>
+            <a:endParaRPr lang="da-DK" sz="2400" dirty="0">
+              <a:effectLst/>
+            </a:endParaRPr>
+          </a:p>
+        </p:txBody>
+      </p:sp>
+      <p:pic>
+        <p:nvPicPr>
+          <p:cNvPr id="4" name="Picture 3">
+            <a:extLst>
+              <a:ext uri="{FF2B5EF4-FFF2-40B4-BE49-F238E27FC236}">
+                <a16:creationId xmlns:a16="http://schemas.microsoft.com/office/drawing/2014/main" id="{C9334CDF-F5DB-3D4C-9471-BD5475695A15}"/>
+              </a:ext>
+            </a:extLst>
+          </p:cNvPr>
+          <p:cNvPicPr>
+            <a:picLocks noChangeAspect="1"/>
+          </p:cNvPicPr>
+          <p:nvPr/>
+        </p:nvPicPr>
+        <p:blipFill>
+          <a:blip r:embed="rId2"/>
+          <a:stretch>
+            <a:fillRect/>
+          </a:stretch>
+        </p:blipFill>
+        <p:spPr>
+          <a:xfrm>
+            <a:off x="7996657" y="1208308"/>
+            <a:ext cx="3152588" cy="2104352"/>
+          </a:xfrm>
+          <a:prstGeom prst="rect">
+            <a:avLst/>
+          </a:prstGeom>
+        </p:spPr>
+      </p:pic>
+      <p:pic>
+        <p:nvPicPr>
+          <p:cNvPr id="7" name="Picture 6">
+            <a:extLst>
+              <a:ext uri="{FF2B5EF4-FFF2-40B4-BE49-F238E27FC236}">
+                <a16:creationId xmlns:a16="http://schemas.microsoft.com/office/drawing/2014/main" id="{F0ED2F38-0C97-7C42-9AD3-216D57892A7B}"/>
+              </a:ext>
+            </a:extLst>
+          </p:cNvPr>
+          <p:cNvPicPr>
+            <a:picLocks noChangeAspect="1"/>
+          </p:cNvPicPr>
+          <p:nvPr/>
+        </p:nvPicPr>
+        <p:blipFill>
+          <a:blip r:embed="rId3"/>
+          <a:stretch>
+            <a:fillRect/>
+          </a:stretch>
+        </p:blipFill>
+        <p:spPr>
+          <a:xfrm>
+            <a:off x="1125069" y="1613647"/>
+            <a:ext cx="2514600" cy="2286000"/>
+          </a:xfrm>
+          <a:prstGeom prst="rect">
+            <a:avLst/>
+          </a:prstGeom>
+        </p:spPr>
+      </p:pic>
+      <p:pic>
+        <p:nvPicPr>
+          <p:cNvPr id="10" name="Picture 9">
+            <a:extLst>
+              <a:ext uri="{FF2B5EF4-FFF2-40B4-BE49-F238E27FC236}">
+                <a16:creationId xmlns:a16="http://schemas.microsoft.com/office/drawing/2014/main" id="{415F8E70-D915-3442-8EA0-C66A466436EA}"/>
+              </a:ext>
+            </a:extLst>
+          </p:cNvPr>
+          <p:cNvPicPr>
+            <a:picLocks noChangeAspect="1"/>
+          </p:cNvPicPr>
+          <p:nvPr/>
+        </p:nvPicPr>
+        <p:blipFill>
+          <a:blip r:embed="rId4"/>
+          <a:stretch>
+            <a:fillRect/>
+          </a:stretch>
+        </p:blipFill>
+        <p:spPr>
+          <a:xfrm>
+            <a:off x="402665" y="5806141"/>
+            <a:ext cx="2171700" cy="749300"/>
+          </a:xfrm>
+          <a:prstGeom prst="rect">
+            <a:avLst/>
+          </a:prstGeom>
+        </p:spPr>
+      </p:pic>
+      <p:pic>
+        <p:nvPicPr>
+          <p:cNvPr id="14" name="Picture 13">
+            <a:extLst>
+              <a:ext uri="{FF2B5EF4-FFF2-40B4-BE49-F238E27FC236}">
+                <a16:creationId xmlns:a16="http://schemas.microsoft.com/office/drawing/2014/main" id="{90002F4E-8729-8248-9CA6-0A2D5F654FC1}"/>
+              </a:ext>
+            </a:extLst>
+          </p:cNvPr>
+          <p:cNvPicPr>
+            <a:picLocks noChangeAspect="1"/>
+          </p:cNvPicPr>
+          <p:nvPr/>
+        </p:nvPicPr>
+        <p:blipFill>
+          <a:blip r:embed="rId5"/>
+          <a:stretch>
+            <a:fillRect/>
+          </a:stretch>
+        </p:blipFill>
+        <p:spPr>
+          <a:xfrm>
+            <a:off x="2654300" y="4864100"/>
+            <a:ext cx="2184400" cy="1701800"/>
+          </a:xfrm>
+          <a:prstGeom prst="rect">
+            <a:avLst/>
+          </a:prstGeom>
+        </p:spPr>
+      </p:pic>
+      <p:pic>
+        <p:nvPicPr>
+          <p:cNvPr id="18" name="Picture 17">
+            <a:extLst>
+              <a:ext uri="{FF2B5EF4-FFF2-40B4-BE49-F238E27FC236}">
+                <a16:creationId xmlns:a16="http://schemas.microsoft.com/office/drawing/2014/main" id="{F8D516B3-E3F1-C345-9E9B-88019693837C}"/>
+              </a:ext>
+            </a:extLst>
+          </p:cNvPr>
+          <p:cNvPicPr>
+            <a:picLocks noChangeAspect="1"/>
+          </p:cNvPicPr>
+          <p:nvPr/>
+        </p:nvPicPr>
+        <p:blipFill>
+          <a:blip r:embed="rId6"/>
+          <a:stretch>
+            <a:fillRect/>
+          </a:stretch>
+        </p:blipFill>
+        <p:spPr>
+          <a:xfrm>
+            <a:off x="4918635" y="5412441"/>
+            <a:ext cx="2171700" cy="1143000"/>
+          </a:xfrm>
+          <a:prstGeom prst="rect">
+            <a:avLst/>
+          </a:prstGeom>
+        </p:spPr>
+      </p:pic>
+      <p:sp>
+        <p:nvSpPr>
+          <p:cNvPr id="20" name="Cloud 19">
+            <a:extLst>
+              <a:ext uri="{FF2B5EF4-FFF2-40B4-BE49-F238E27FC236}">
+                <a16:creationId xmlns:a16="http://schemas.microsoft.com/office/drawing/2014/main" id="{2185C25F-534E-B648-8508-9E5B84E18D5D}"/>
+              </a:ext>
+            </a:extLst>
+          </p:cNvPr>
+          <p:cNvSpPr/>
+          <p:nvPr/>
+        </p:nvSpPr>
+        <p:spPr>
+          <a:xfrm>
+            <a:off x="7677509" y="3847381"/>
+            <a:ext cx="3703185" cy="2518913"/>
+          </a:xfrm>
+          <a:prstGeom prst="cloud">
+            <a:avLst/>
+          </a:prstGeom>
+        </p:spPr>
+        <p:style>
+          <a:lnRef idx="2">
+            <a:schemeClr val="accent1">
+              <a:shade val="50000"/>
+            </a:schemeClr>
+          </a:lnRef>
+          <a:fillRef idx="1">
+            <a:schemeClr val="accent1"/>
+          </a:fillRef>
+          <a:effectRef idx="0">
+            <a:schemeClr val="accent1"/>
+          </a:effectRef>
+          <a:fontRef idx="minor">
+            <a:schemeClr val="lt1"/>
+          </a:fontRef>
+        </p:style>
+        <p:txBody>
+          <a:bodyPr rtlCol="0" anchor="ctr"/>
+          <a:lstStyle/>
+          <a:p>
+            <a:pPr algn="ctr"/>
+            <a:r>
+              <a:rPr lang="en-GB" dirty="0"/>
+              <a:t>ref 1 = -1.0</a:t>
+            </a:r>
+          </a:p>
+        </p:txBody>
+      </p:sp>
+      <p:sp>
+        <p:nvSpPr>
+          <p:cNvPr id="22" name="TextBox 21">
+            <a:extLst>
+              <a:ext uri="{FF2B5EF4-FFF2-40B4-BE49-F238E27FC236}">
+                <a16:creationId xmlns:a16="http://schemas.microsoft.com/office/drawing/2014/main" id="{EA4FD553-06B6-C14B-906F-41DF59FB78EF}"/>
+              </a:ext>
+            </a:extLst>
+          </p:cNvPr>
+          <p:cNvSpPr txBox="1"/>
+          <p:nvPr/>
+        </p:nvSpPr>
+        <p:spPr>
+          <a:xfrm>
+            <a:off x="9684915" y="4617006"/>
+            <a:ext cx="546945" cy="369332"/>
+          </a:xfrm>
+          <a:prstGeom prst="rect">
+            <a:avLst/>
+          </a:prstGeom>
+          <a:noFill/>
+        </p:spPr>
+        <p:txBody>
+          <a:bodyPr wrap="none" rtlCol="0">
+            <a:spAutoFit/>
+          </a:bodyPr>
+          <a:lstStyle/>
+          <a:p>
+            <a:r>
+              <a:rPr lang="en-GB" dirty="0">
+                <a:solidFill>
+                  <a:schemeClr val="lt1"/>
+                </a:solidFill>
+              </a:rPr>
+              <a:t>-0.5</a:t>
+            </a:r>
+          </a:p>
+        </p:txBody>
+      </p:sp>
+      <p:cxnSp>
+        <p:nvCxnSpPr>
+          <p:cNvPr id="24" name="Straight Connector 23">
+            <a:extLst>
+              <a:ext uri="{FF2B5EF4-FFF2-40B4-BE49-F238E27FC236}">
+                <a16:creationId xmlns:a16="http://schemas.microsoft.com/office/drawing/2014/main" id="{FDF42536-67C7-D746-9F95-FD6882BF8E68}"/>
+              </a:ext>
+            </a:extLst>
+          </p:cNvPr>
+          <p:cNvCxnSpPr>
+            <a:cxnSpLocks/>
+          </p:cNvCxnSpPr>
+          <p:nvPr/>
+        </p:nvCxnSpPr>
+        <p:spPr>
+          <a:xfrm flipV="1">
+            <a:off x="9529101" y="4986338"/>
+            <a:ext cx="429287" cy="120500"/>
+          </a:xfrm>
+          <a:prstGeom prst="line">
+            <a:avLst/>
+          </a:prstGeom>
+          <a:ln w="38100">
+            <a:solidFill>
+              <a:srgbClr val="C00000"/>
+            </a:solidFill>
+          </a:ln>
+        </p:spPr>
+        <p:style>
+          <a:lnRef idx="1">
+            <a:schemeClr val="accent1"/>
+          </a:lnRef>
+          <a:fillRef idx="0">
+            <a:schemeClr val="accent1"/>
+          </a:fillRef>
+          <a:effectRef idx="0">
+            <a:schemeClr val="accent1"/>
+          </a:effectRef>
+          <a:fontRef idx="minor">
+            <a:schemeClr val="tx1"/>
+          </a:fontRef>
+        </p:style>
+      </p:cxnSp>
+    </p:spTree>
+    <p:extLst>
+      <p:ext uri="{BB962C8B-B14F-4D97-AF65-F5344CB8AC3E}">
+        <p14:creationId xmlns:p14="http://schemas.microsoft.com/office/powerpoint/2010/main" val="503192470"/>
+      </p:ext>
+    </p:extLst>
+  </p:cSld>
+  <p:clrMapOvr>
+    <a:masterClrMapping/>
+  </p:clrMapOvr>
+  <p:timing>
+    <p:tnLst>
+      <p:par>
+        <p:cTn id="1" dur="indefinite" restart="never" nodeType="tmRoot">
+          <p:childTnLst>
+            <p:seq concurrent="1" nextAc="seek">
+              <p:cTn id="2" dur="indefinite" nodeType="mainSeq">
+                <p:childTnLst>
+                  <p:par>
+                    <p:cTn id="3" fill="hold">
+                      <p:stCondLst>
+                        <p:cond delay="indefinite"/>
+                      </p:stCondLst>
+                      <p:childTnLst>
+                        <p:par>
+                          <p:cTn id="4" fill="hold">
+                            <p:stCondLst>
+                              <p:cond delay="0"/>
+                            </p:stCondLst>
+                            <p:childTnLst>
+                              <p:par>
+                                <p:cTn id="5" presetID="1" presetClass="entr" presetSubtype="0" fill="hold" nodeType="clickEffect">
+                                  <p:stCondLst>
+                                    <p:cond delay="0"/>
+                                  </p:stCondLst>
+                                  <p:childTnLst>
+                                    <p:set>
+                                      <p:cBhvr>
+                                        <p:cTn id="6" dur="1" fill="hold">
+                                          <p:stCondLst>
+                                            <p:cond delay="0"/>
+                                          </p:stCondLst>
+                                        </p:cTn>
+                                        <p:tgtEl>
+                                          <p:spTgt spid="14"/>
+                                        </p:tgtEl>
+                                        <p:attrNameLst>
+                                          <p:attrName>style.visibility</p:attrName>
+                                        </p:attrNameLst>
+                                      </p:cBhvr>
+                                      <p:to>
+                                        <p:strVal val="visible"/>
+                                      </p:to>
+                                    </p:set>
+                                  </p:childTnLst>
+                                </p:cTn>
+                              </p:par>
+                            </p:childTnLst>
+                          </p:cTn>
+                        </p:par>
+                      </p:childTnLst>
+                    </p:cTn>
+                  </p:par>
+                  <p:par>
+                    <p:cTn id="7" fill="hold">
+                      <p:stCondLst>
+                        <p:cond delay="indefinite"/>
+                      </p:stCondLst>
+                      <p:childTnLst>
+                        <p:par>
+                          <p:cTn id="8" fill="hold">
+                            <p:stCondLst>
+                              <p:cond delay="0"/>
+                            </p:stCondLst>
+                            <p:childTnLst>
+                              <p:par>
+                                <p:cTn id="9" presetID="1" presetClass="entr" presetSubtype="0" fill="hold" nodeType="clickEffect">
+                                  <p:stCondLst>
+                                    <p:cond delay="0"/>
+                                  </p:stCondLst>
+                                  <p:childTnLst>
+                                    <p:set>
+                                      <p:cBhvr>
+                                        <p:cTn id="10" dur="1" fill="hold">
+                                          <p:stCondLst>
+                                            <p:cond delay="0"/>
+                                          </p:stCondLst>
+                                        </p:cTn>
+                                        <p:tgtEl>
+                                          <p:spTgt spid="24"/>
+                                        </p:tgtEl>
+                                        <p:attrNameLst>
+                                          <p:attrName>style.visibility</p:attrName>
+                                        </p:attrNameLst>
+                                      </p:cBhvr>
+                                      <p:to>
+                                        <p:strVal val="visible"/>
+                                      </p:to>
+                                    </p:set>
+                                  </p:childTnLst>
+                                </p:cTn>
+                              </p:par>
+                              <p:par>
+                                <p:cTn id="11" presetID="1" presetClass="entr" presetSubtype="0" fill="hold" grpId="0" nodeType="withEffect">
+                                  <p:stCondLst>
+                                    <p:cond delay="0"/>
+                                  </p:stCondLst>
+                                  <p:childTnLst>
+                                    <p:set>
+                                      <p:cBhvr>
+                                        <p:cTn id="12" dur="1" fill="hold">
+                                          <p:stCondLst>
+                                            <p:cond delay="0"/>
+                                          </p:stCondLst>
+                                        </p:cTn>
+                                        <p:tgtEl>
+                                          <p:spTgt spid="22"/>
+                                        </p:tgtEl>
+                                        <p:attrNameLst>
+                                          <p:attrName>style.visibility</p:attrName>
+                                        </p:attrNameLst>
+                                      </p:cBhvr>
+                                      <p:to>
+                                        <p:strVal val="visible"/>
+                                      </p:to>
+                                    </p:set>
+                                  </p:childTnLst>
+                                </p:cTn>
+                              </p:par>
+                            </p:childTnLst>
+                          </p:cTn>
+                        </p:par>
+                      </p:childTnLst>
+                    </p:cTn>
+                  </p:par>
+                  <p:par>
+                    <p:cTn id="13" fill="hold">
+                      <p:stCondLst>
+                        <p:cond delay="indefinite"/>
+                      </p:stCondLst>
+                      <p:childTnLst>
+                        <p:par>
+                          <p:cTn id="14" fill="hold">
+                            <p:stCondLst>
+                              <p:cond delay="0"/>
+                            </p:stCondLst>
+                            <p:childTnLst>
+                              <p:par>
+                                <p:cTn id="15" presetID="1" presetClass="entr" presetSubtype="0" fill="hold" nodeType="clickEffect">
+                                  <p:stCondLst>
+                                    <p:cond delay="0"/>
+                                  </p:stCondLst>
+                                  <p:childTnLst>
+                                    <p:set>
+                                      <p:cBhvr>
+                                        <p:cTn id="16" dur="1" fill="hold">
+                                          <p:stCondLst>
+                                            <p:cond delay="0"/>
+                                          </p:stCondLst>
+                                        </p:cTn>
+                                        <p:tgtEl>
+                                          <p:spTgt spid="18"/>
+                                        </p:tgtEl>
+                                        <p:attrNameLst>
+                                          <p:attrName>style.visibility</p:attrName>
+                                        </p:attrNameLst>
+                                      </p:cBhvr>
+                                      <p:to>
+                                        <p:strVal val="visible"/>
+                                      </p:to>
+                                    </p:set>
+                                  </p:childTnLst>
+                                </p:cTn>
+                              </p:par>
+                            </p:childTnLst>
+                          </p:cTn>
+                        </p:par>
+                      </p:childTnLst>
+                    </p:cTn>
+                  </p:par>
+                </p:childTnLst>
+              </p:cTn>
+              <p:prevCondLst>
+                <p:cond evt="onPrev" delay="0">
+                  <p:tgtEl>
+                    <p:sldTgt/>
+                  </p:tgtEl>
+                </p:cond>
+              </p:prevCondLst>
+              <p:nextCondLst>
+                <p:cond evt="onNext" delay="0">
+                  <p:tgtEl>
+                    <p:sldTgt/>
+                  </p:tgtEl>
+                </p:cond>
+              </p:nextCondLst>
+            </p:seq>
+          </p:childTnLst>
+        </p:cTn>
+      </p:par>
+    </p:tnLst>
+    <p:bldLst>
+      <p:bldP spid="22" grpId="0"/>
+    </p:bldLst>
+  </p:timing>
+</p:sld>
+</file>
+
+<file path=ppt/slides/slide5.xml><?xml version="1.0" encoding="utf-8"?>
+<p:sld xmlns:a="http://schemas.openxmlformats.org/drawingml/2006/main" xmlns:r="http://schemas.openxmlformats.org/officeDocument/2006/relationships" xmlns:p="http://schemas.openxmlformats.org/presentationml/2006/main">
+  <p:cSld>
+    <p:spTree>
+      <p:nvGrpSpPr>
+        <p:cNvPr id="1" name=""/>
+        <p:cNvGrpSpPr/>
+        <p:nvPr/>
+      </p:nvGrpSpPr>
+      <p:grpSpPr>
+        <a:xfrm>
+          <a:off x="0" y="0"/>
+          <a:ext cx="0" cy="0"/>
+          <a:chOff x="0" y="0"/>
+          <a:chExt cx="0" cy="0"/>
+        </a:xfrm>
+      </p:grpSpPr>
+      <p:sp>
+        <p:nvSpPr>
+          <p:cNvPr id="2" name="Title 1">
+            <a:extLst>
+              <a:ext uri="{FF2B5EF4-FFF2-40B4-BE49-F238E27FC236}">
+                <a16:creationId xmlns:a16="http://schemas.microsoft.com/office/drawing/2014/main" id="{A8CA17A2-0347-F144-A97A-4BE9B0BFC4E0}"/>
+              </a:ext>
+            </a:extLst>
+          </p:cNvPr>
+          <p:cNvSpPr>
+            <a:spLocks noGrp="1"/>
+          </p:cNvSpPr>
+          <p:nvPr>
+            <p:ph type="title"/>
+          </p:nvPr>
+        </p:nvSpPr>
+        <p:spPr/>
+        <p:txBody>
+          <a:bodyPr/>
+          <a:lstStyle/>
+          <a:p>
+            <a:r>
+              <a:rPr lang="da-DK" dirty="0" err="1"/>
+              <a:t>Aliasing</a:t>
+            </a:r>
+            <a:r>
+              <a:rPr lang="da-DK" dirty="0"/>
+              <a:t> (</a:t>
+            </a:r>
+            <a:r>
+              <a:rPr lang="da-DK" dirty="0" err="1"/>
+              <a:t>undga</a:t>
+            </a:r>
+            <a:r>
+              <a:rPr lang="da-DK" dirty="0"/>
+              <a:t>̊!)</a:t>
+            </a:r>
+            <a:endParaRPr lang="en-GB" dirty="0"/>
+          </a:p>
+        </p:txBody>
+      </p:sp>
+      <p:sp>
+        <p:nvSpPr>
+          <p:cNvPr id="3" name="Content Placeholder 2">
+            <a:extLst>
+              <a:ext uri="{FF2B5EF4-FFF2-40B4-BE49-F238E27FC236}">
+                <a16:creationId xmlns:a16="http://schemas.microsoft.com/office/drawing/2014/main" id="{D3A660C2-701A-7B4F-9E11-8EF8A8F53E99}"/>
+              </a:ext>
+            </a:extLst>
+          </p:cNvPr>
+          <p:cNvSpPr>
+            <a:spLocks noGrp="1"/>
+          </p:cNvSpPr>
+          <p:nvPr>
+            <p:ph idx="1"/>
+          </p:nvPr>
+        </p:nvSpPr>
+        <p:spPr/>
+        <p:txBody>
+          <a:bodyPr>
+            <a:normAutofit fontScale="62500" lnSpcReduction="20000"/>
+          </a:bodyPr>
+          <a:lstStyle/>
+          <a:p>
+            <a:pPr marL="0" indent="0">
+              <a:buNone/>
+            </a:pPr>
+            <a:r>
+              <a:rPr lang="da-DK" dirty="0">
+                <a:latin typeface="DejaVu Sans Book" panose="020B0603030804020204" pitchFamily="34" charset="0"/>
+                <a:ea typeface="DejaVu Sans Book" panose="020B0603030804020204" pitchFamily="34" charset="0"/>
+                <a:cs typeface="DejaVu Sans Book" panose="020B0603030804020204" pitchFamily="34" charset="0"/>
+              </a:rPr>
+              <a:t>&gt; let a = </a:t>
+            </a:r>
+            <a:r>
+              <a:rPr lang="da-DK" dirty="0" err="1">
+                <a:latin typeface="DejaVu Sans Book" panose="020B0603030804020204" pitchFamily="34" charset="0"/>
+                <a:ea typeface="DejaVu Sans Book" panose="020B0603030804020204" pitchFamily="34" charset="0"/>
+                <a:cs typeface="DejaVu Sans Book" panose="020B0603030804020204" pitchFamily="34" charset="0"/>
+              </a:rPr>
+              <a:t>ref</a:t>
+            </a:r>
+            <a:r>
+              <a:rPr lang="da-DK" dirty="0">
+                <a:latin typeface="DejaVu Sans Book" panose="020B0603030804020204" pitchFamily="34" charset="0"/>
+                <a:ea typeface="DejaVu Sans Book" panose="020B0603030804020204" pitchFamily="34" charset="0"/>
+                <a:cs typeface="DejaVu Sans Book" panose="020B0603030804020204" pitchFamily="34" charset="0"/>
+              </a:rPr>
+              <a:t> 1.0</a:t>
+            </a:r>
+          </a:p>
+          <a:p>
+            <a:pPr marL="0" indent="0">
+              <a:buNone/>
+            </a:pPr>
+            <a:r>
+              <a:rPr lang="da-DK" dirty="0">
+                <a:latin typeface="DejaVu Sans Book" panose="020B0603030804020204" pitchFamily="34" charset="0"/>
+                <a:ea typeface="DejaVu Sans Book" panose="020B0603030804020204" pitchFamily="34" charset="0"/>
+                <a:cs typeface="DejaVu Sans Book" panose="020B0603030804020204" pitchFamily="34" charset="0"/>
+              </a:rPr>
+              <a:t>- let b = </a:t>
+            </a:r>
+            <a:r>
+              <a:rPr lang="da-DK" dirty="0" err="1">
+                <a:latin typeface="DejaVu Sans Book" panose="020B0603030804020204" pitchFamily="34" charset="0"/>
+                <a:ea typeface="DejaVu Sans Book" panose="020B0603030804020204" pitchFamily="34" charset="0"/>
+                <a:cs typeface="DejaVu Sans Book" panose="020B0603030804020204" pitchFamily="34" charset="0"/>
+              </a:rPr>
+              <a:t>ref</a:t>
+            </a:r>
+            <a:r>
+              <a:rPr lang="da-DK" dirty="0">
+                <a:latin typeface="DejaVu Sans Book" panose="020B0603030804020204" pitchFamily="34" charset="0"/>
+                <a:ea typeface="DejaVu Sans Book" panose="020B0603030804020204" pitchFamily="34" charset="0"/>
+                <a:cs typeface="DejaVu Sans Book" panose="020B0603030804020204" pitchFamily="34" charset="0"/>
+              </a:rPr>
+              <a:t> 2.0</a:t>
+            </a:r>
+          </a:p>
+          <a:p>
+            <a:pPr marL="0" indent="0">
+              <a:buNone/>
+            </a:pPr>
+            <a:r>
+              <a:rPr lang="da-DK" dirty="0">
+                <a:latin typeface="DejaVu Sans Book" panose="020B0603030804020204" pitchFamily="34" charset="0"/>
+                <a:ea typeface="DejaVu Sans Book" panose="020B0603030804020204" pitchFamily="34" charset="0"/>
+                <a:cs typeface="DejaVu Sans Book" panose="020B0603030804020204" pitchFamily="34" charset="0"/>
+              </a:rPr>
+              <a:t>- let c = a</a:t>
+            </a:r>
+          </a:p>
+          <a:p>
+            <a:pPr marL="0" indent="0">
+              <a:buNone/>
+            </a:pPr>
+            <a:r>
+              <a:rPr lang="da-DK" dirty="0">
+                <a:latin typeface="DejaVu Sans Book" panose="020B0603030804020204" pitchFamily="34" charset="0"/>
+                <a:ea typeface="DejaVu Sans Book" panose="020B0603030804020204" pitchFamily="34" charset="0"/>
+                <a:cs typeface="DejaVu Sans Book" panose="020B0603030804020204" pitchFamily="34" charset="0"/>
+              </a:rPr>
+              <a:t>- </a:t>
+            </a:r>
+            <a:r>
+              <a:rPr lang="da-DK" dirty="0" err="1">
+                <a:latin typeface="DejaVu Sans Book" panose="020B0603030804020204" pitchFamily="34" charset="0"/>
+                <a:ea typeface="DejaVu Sans Book" panose="020B0603030804020204" pitchFamily="34" charset="0"/>
+                <a:cs typeface="DejaVu Sans Book" panose="020B0603030804020204" pitchFamily="34" charset="0"/>
+              </a:rPr>
+              <a:t>printfn</a:t>
+            </a:r>
+            <a:r>
+              <a:rPr lang="da-DK" dirty="0">
+                <a:latin typeface="DejaVu Sans Book" panose="020B0603030804020204" pitchFamily="34" charset="0"/>
+                <a:ea typeface="DejaVu Sans Book" panose="020B0603030804020204" pitchFamily="34" charset="0"/>
+                <a:cs typeface="DejaVu Sans Book" panose="020B0603030804020204" pitchFamily="34" charset="0"/>
+              </a:rPr>
+              <a:t> "a = %g, b = %g, c = %g" !a !b !c</a:t>
+            </a:r>
+          </a:p>
+          <a:p>
+            <a:pPr marL="0" indent="0">
+              <a:buNone/>
+            </a:pPr>
+            <a:r>
+              <a:rPr lang="da-DK" dirty="0">
+                <a:latin typeface="DejaVu Sans Book" panose="020B0603030804020204" pitchFamily="34" charset="0"/>
+                <a:ea typeface="DejaVu Sans Book" panose="020B0603030804020204" pitchFamily="34" charset="0"/>
+                <a:cs typeface="DejaVu Sans Book" panose="020B0603030804020204" pitchFamily="34" charset="0"/>
+              </a:rPr>
+              <a:t>- b := 3.0</a:t>
+            </a:r>
+          </a:p>
+          <a:p>
+            <a:pPr marL="0" indent="0">
+              <a:buNone/>
+            </a:pPr>
+            <a:r>
+              <a:rPr lang="da-DK" dirty="0">
+                <a:latin typeface="DejaVu Sans Book" panose="020B0603030804020204" pitchFamily="34" charset="0"/>
+                <a:ea typeface="DejaVu Sans Book" panose="020B0603030804020204" pitchFamily="34" charset="0"/>
+                <a:cs typeface="DejaVu Sans Book" panose="020B0603030804020204" pitchFamily="34" charset="0"/>
+              </a:rPr>
+              <a:t>- c := 4.0</a:t>
+            </a:r>
+          </a:p>
+          <a:p>
+            <a:pPr marL="0" indent="0">
+              <a:buNone/>
+            </a:pPr>
+            <a:r>
+              <a:rPr lang="da-DK" dirty="0">
+                <a:latin typeface="DejaVu Sans Book" panose="020B0603030804020204" pitchFamily="34" charset="0"/>
+                <a:ea typeface="DejaVu Sans Book" panose="020B0603030804020204" pitchFamily="34" charset="0"/>
+                <a:cs typeface="DejaVu Sans Book" panose="020B0603030804020204" pitchFamily="34" charset="0"/>
+              </a:rPr>
+              <a:t>- </a:t>
+            </a:r>
+            <a:r>
+              <a:rPr lang="da-DK" dirty="0" err="1">
+                <a:latin typeface="DejaVu Sans Book" panose="020B0603030804020204" pitchFamily="34" charset="0"/>
+                <a:ea typeface="DejaVu Sans Book" panose="020B0603030804020204" pitchFamily="34" charset="0"/>
+                <a:cs typeface="DejaVu Sans Book" panose="020B0603030804020204" pitchFamily="34" charset="0"/>
+              </a:rPr>
+              <a:t>printfn</a:t>
+            </a:r>
+            <a:r>
+              <a:rPr lang="da-DK" dirty="0">
+                <a:latin typeface="DejaVu Sans Book" panose="020B0603030804020204" pitchFamily="34" charset="0"/>
+                <a:ea typeface="DejaVu Sans Book" panose="020B0603030804020204" pitchFamily="34" charset="0"/>
+                <a:cs typeface="DejaVu Sans Book" panose="020B0603030804020204" pitchFamily="34" charset="0"/>
+              </a:rPr>
+              <a:t> "a = %g, b = %g, c = %g" !a !b !c;;</a:t>
+            </a:r>
+          </a:p>
+          <a:p>
+            <a:pPr marL="0" indent="0">
+              <a:buNone/>
+            </a:pPr>
+            <a:r>
+              <a:rPr lang="da-DK" dirty="0">
+                <a:latin typeface="DejaVu Sans Book" panose="020B0603030804020204" pitchFamily="34" charset="0"/>
+                <a:ea typeface="DejaVu Sans Book" panose="020B0603030804020204" pitchFamily="34" charset="0"/>
+                <a:cs typeface="DejaVu Sans Book" panose="020B0603030804020204" pitchFamily="34" charset="0"/>
+              </a:rPr>
+              <a:t>a = 1, b = 2, c = 1</a:t>
+            </a:r>
+          </a:p>
+          <a:p>
+            <a:pPr marL="0" indent="0">
+              <a:buNone/>
+            </a:pPr>
+            <a:r>
+              <a:rPr lang="da-DK" dirty="0">
+                <a:latin typeface="DejaVu Sans Book" panose="020B0603030804020204" pitchFamily="34" charset="0"/>
+                <a:ea typeface="DejaVu Sans Book" panose="020B0603030804020204" pitchFamily="34" charset="0"/>
+                <a:cs typeface="DejaVu Sans Book" panose="020B0603030804020204" pitchFamily="34" charset="0"/>
+              </a:rPr>
+              <a:t>a = 4, b = 3, c = 4</a:t>
+            </a:r>
+          </a:p>
+          <a:p>
+            <a:pPr marL="0" indent="0">
+              <a:buNone/>
+            </a:pPr>
+            <a:r>
+              <a:rPr lang="da-DK" dirty="0">
+                <a:latin typeface="DejaVu Sans Book" panose="020B0603030804020204" pitchFamily="34" charset="0"/>
+                <a:ea typeface="DejaVu Sans Book" panose="020B0603030804020204" pitchFamily="34" charset="0"/>
+                <a:cs typeface="DejaVu Sans Book" panose="020B0603030804020204" pitchFamily="34" charset="0"/>
+              </a:rPr>
+              <a:t>val a : </a:t>
+            </a:r>
+            <a:r>
+              <a:rPr lang="da-DK" dirty="0" err="1">
+                <a:latin typeface="DejaVu Sans Book" panose="020B0603030804020204" pitchFamily="34" charset="0"/>
+                <a:ea typeface="DejaVu Sans Book" panose="020B0603030804020204" pitchFamily="34" charset="0"/>
+                <a:cs typeface="DejaVu Sans Book" panose="020B0603030804020204" pitchFamily="34" charset="0"/>
+              </a:rPr>
+              <a:t>float</a:t>
+            </a:r>
+            <a:r>
+              <a:rPr lang="da-DK" dirty="0">
+                <a:latin typeface="DejaVu Sans Book" panose="020B0603030804020204" pitchFamily="34" charset="0"/>
+                <a:ea typeface="DejaVu Sans Book" panose="020B0603030804020204" pitchFamily="34" charset="0"/>
+                <a:cs typeface="DejaVu Sans Book" panose="020B0603030804020204" pitchFamily="34" charset="0"/>
+              </a:rPr>
+              <a:t> </a:t>
+            </a:r>
+            <a:r>
+              <a:rPr lang="da-DK" dirty="0" err="1">
+                <a:latin typeface="DejaVu Sans Book" panose="020B0603030804020204" pitchFamily="34" charset="0"/>
+                <a:ea typeface="DejaVu Sans Book" panose="020B0603030804020204" pitchFamily="34" charset="0"/>
+                <a:cs typeface="DejaVu Sans Book" panose="020B0603030804020204" pitchFamily="34" charset="0"/>
+              </a:rPr>
+              <a:t>ref</a:t>
+            </a:r>
+            <a:r>
+              <a:rPr lang="da-DK" dirty="0">
+                <a:latin typeface="DejaVu Sans Book" panose="020B0603030804020204" pitchFamily="34" charset="0"/>
+                <a:ea typeface="DejaVu Sans Book" panose="020B0603030804020204" pitchFamily="34" charset="0"/>
+                <a:cs typeface="DejaVu Sans Book" panose="020B0603030804020204" pitchFamily="34" charset="0"/>
+              </a:rPr>
+              <a:t> = {</a:t>
+            </a:r>
+            <a:r>
+              <a:rPr lang="da-DK" dirty="0" err="1">
+                <a:latin typeface="DejaVu Sans Book" panose="020B0603030804020204" pitchFamily="34" charset="0"/>
+                <a:ea typeface="DejaVu Sans Book" panose="020B0603030804020204" pitchFamily="34" charset="0"/>
+                <a:cs typeface="DejaVu Sans Book" panose="020B0603030804020204" pitchFamily="34" charset="0"/>
+              </a:rPr>
+              <a:t>contents</a:t>
+            </a:r>
+            <a:r>
+              <a:rPr lang="da-DK" dirty="0">
+                <a:latin typeface="DejaVu Sans Book" panose="020B0603030804020204" pitchFamily="34" charset="0"/>
+                <a:ea typeface="DejaVu Sans Book" panose="020B0603030804020204" pitchFamily="34" charset="0"/>
+                <a:cs typeface="DejaVu Sans Book" panose="020B0603030804020204" pitchFamily="34" charset="0"/>
+              </a:rPr>
+              <a:t> = 4.0;}</a:t>
+            </a:r>
+          </a:p>
+          <a:p>
+            <a:pPr marL="0" indent="0">
+              <a:buNone/>
+            </a:pPr>
+            <a:r>
+              <a:rPr lang="da-DK" dirty="0">
+                <a:latin typeface="DejaVu Sans Book" panose="020B0603030804020204" pitchFamily="34" charset="0"/>
+                <a:ea typeface="DejaVu Sans Book" panose="020B0603030804020204" pitchFamily="34" charset="0"/>
+                <a:cs typeface="DejaVu Sans Book" panose="020B0603030804020204" pitchFamily="34" charset="0"/>
+              </a:rPr>
+              <a:t>val b : </a:t>
+            </a:r>
+            <a:r>
+              <a:rPr lang="da-DK" dirty="0" err="1">
+                <a:latin typeface="DejaVu Sans Book" panose="020B0603030804020204" pitchFamily="34" charset="0"/>
+                <a:ea typeface="DejaVu Sans Book" panose="020B0603030804020204" pitchFamily="34" charset="0"/>
+                <a:cs typeface="DejaVu Sans Book" panose="020B0603030804020204" pitchFamily="34" charset="0"/>
+              </a:rPr>
+              <a:t>float</a:t>
+            </a:r>
+            <a:r>
+              <a:rPr lang="da-DK" dirty="0">
+                <a:latin typeface="DejaVu Sans Book" panose="020B0603030804020204" pitchFamily="34" charset="0"/>
+                <a:ea typeface="DejaVu Sans Book" panose="020B0603030804020204" pitchFamily="34" charset="0"/>
+                <a:cs typeface="DejaVu Sans Book" panose="020B0603030804020204" pitchFamily="34" charset="0"/>
+              </a:rPr>
+              <a:t> </a:t>
+            </a:r>
+            <a:r>
+              <a:rPr lang="da-DK" dirty="0" err="1">
+                <a:latin typeface="DejaVu Sans Book" panose="020B0603030804020204" pitchFamily="34" charset="0"/>
+                <a:ea typeface="DejaVu Sans Book" panose="020B0603030804020204" pitchFamily="34" charset="0"/>
+                <a:cs typeface="DejaVu Sans Book" panose="020B0603030804020204" pitchFamily="34" charset="0"/>
+              </a:rPr>
+              <a:t>ref</a:t>
+            </a:r>
+            <a:r>
+              <a:rPr lang="da-DK" dirty="0">
+                <a:latin typeface="DejaVu Sans Book" panose="020B0603030804020204" pitchFamily="34" charset="0"/>
+                <a:ea typeface="DejaVu Sans Book" panose="020B0603030804020204" pitchFamily="34" charset="0"/>
+                <a:cs typeface="DejaVu Sans Book" panose="020B0603030804020204" pitchFamily="34" charset="0"/>
+              </a:rPr>
+              <a:t> = {</a:t>
+            </a:r>
+            <a:r>
+              <a:rPr lang="da-DK" dirty="0" err="1">
+                <a:latin typeface="DejaVu Sans Book" panose="020B0603030804020204" pitchFamily="34" charset="0"/>
+                <a:ea typeface="DejaVu Sans Book" panose="020B0603030804020204" pitchFamily="34" charset="0"/>
+                <a:cs typeface="DejaVu Sans Book" panose="020B0603030804020204" pitchFamily="34" charset="0"/>
+              </a:rPr>
+              <a:t>contents</a:t>
+            </a:r>
+            <a:r>
+              <a:rPr lang="da-DK" dirty="0">
+                <a:latin typeface="DejaVu Sans Book" panose="020B0603030804020204" pitchFamily="34" charset="0"/>
+                <a:ea typeface="DejaVu Sans Book" panose="020B0603030804020204" pitchFamily="34" charset="0"/>
+                <a:cs typeface="DejaVu Sans Book" panose="020B0603030804020204" pitchFamily="34" charset="0"/>
+              </a:rPr>
+              <a:t> = 3.0;}</a:t>
+            </a:r>
+          </a:p>
+          <a:p>
+            <a:pPr marL="0" indent="0">
+              <a:buNone/>
+            </a:pPr>
+            <a:r>
+              <a:rPr lang="da-DK" dirty="0">
+                <a:latin typeface="DejaVu Sans Book" panose="020B0603030804020204" pitchFamily="34" charset="0"/>
+                <a:ea typeface="DejaVu Sans Book" panose="020B0603030804020204" pitchFamily="34" charset="0"/>
+                <a:cs typeface="DejaVu Sans Book" panose="020B0603030804020204" pitchFamily="34" charset="0"/>
+              </a:rPr>
+              <a:t>val c : </a:t>
+            </a:r>
+            <a:r>
+              <a:rPr lang="da-DK" dirty="0" err="1">
+                <a:latin typeface="DejaVu Sans Book" panose="020B0603030804020204" pitchFamily="34" charset="0"/>
+                <a:ea typeface="DejaVu Sans Book" panose="020B0603030804020204" pitchFamily="34" charset="0"/>
+                <a:cs typeface="DejaVu Sans Book" panose="020B0603030804020204" pitchFamily="34" charset="0"/>
+              </a:rPr>
+              <a:t>float</a:t>
+            </a:r>
+            <a:r>
+              <a:rPr lang="da-DK" dirty="0">
+                <a:latin typeface="DejaVu Sans Book" panose="020B0603030804020204" pitchFamily="34" charset="0"/>
+                <a:ea typeface="DejaVu Sans Book" panose="020B0603030804020204" pitchFamily="34" charset="0"/>
+                <a:cs typeface="DejaVu Sans Book" panose="020B0603030804020204" pitchFamily="34" charset="0"/>
+              </a:rPr>
+              <a:t> </a:t>
+            </a:r>
+            <a:r>
+              <a:rPr lang="da-DK" dirty="0" err="1">
+                <a:latin typeface="DejaVu Sans Book" panose="020B0603030804020204" pitchFamily="34" charset="0"/>
+                <a:ea typeface="DejaVu Sans Book" panose="020B0603030804020204" pitchFamily="34" charset="0"/>
+                <a:cs typeface="DejaVu Sans Book" panose="020B0603030804020204" pitchFamily="34" charset="0"/>
+              </a:rPr>
+              <a:t>ref</a:t>
+            </a:r>
+            <a:r>
+              <a:rPr lang="da-DK" dirty="0">
+                <a:latin typeface="DejaVu Sans Book" panose="020B0603030804020204" pitchFamily="34" charset="0"/>
+                <a:ea typeface="DejaVu Sans Book" panose="020B0603030804020204" pitchFamily="34" charset="0"/>
+                <a:cs typeface="DejaVu Sans Book" panose="020B0603030804020204" pitchFamily="34" charset="0"/>
+              </a:rPr>
+              <a:t> = {</a:t>
+            </a:r>
+            <a:r>
+              <a:rPr lang="da-DK" dirty="0" err="1">
+                <a:latin typeface="DejaVu Sans Book" panose="020B0603030804020204" pitchFamily="34" charset="0"/>
+                <a:ea typeface="DejaVu Sans Book" panose="020B0603030804020204" pitchFamily="34" charset="0"/>
+                <a:cs typeface="DejaVu Sans Book" panose="020B0603030804020204" pitchFamily="34" charset="0"/>
+              </a:rPr>
+              <a:t>contents</a:t>
+            </a:r>
+            <a:r>
+              <a:rPr lang="da-DK" dirty="0">
+                <a:latin typeface="DejaVu Sans Book" panose="020B0603030804020204" pitchFamily="34" charset="0"/>
+                <a:ea typeface="DejaVu Sans Book" panose="020B0603030804020204" pitchFamily="34" charset="0"/>
+                <a:cs typeface="DejaVu Sans Book" panose="020B0603030804020204" pitchFamily="34" charset="0"/>
+              </a:rPr>
+              <a:t> = 4.0;}</a:t>
+            </a:r>
+          </a:p>
+          <a:p>
+            <a:pPr marL="0" indent="0">
+              <a:buNone/>
+            </a:pPr>
+            <a:r>
+              <a:rPr lang="da-DK" dirty="0">
+                <a:latin typeface="DejaVu Sans Book" panose="020B0603030804020204" pitchFamily="34" charset="0"/>
+                <a:ea typeface="DejaVu Sans Book" panose="020B0603030804020204" pitchFamily="34" charset="0"/>
+                <a:cs typeface="DejaVu Sans Book" panose="020B0603030804020204" pitchFamily="34" charset="0"/>
+              </a:rPr>
+              <a:t>val it : unit = ()</a:t>
+            </a:r>
+          </a:p>
+          <a:p>
+            <a:pPr marL="0" indent="0">
+              <a:buNone/>
+            </a:pPr>
+            <a:endParaRPr lang="en-GB" dirty="0">
+              <a:latin typeface="DejaVu Sans Book" panose="020B0603030804020204" pitchFamily="34" charset="0"/>
+              <a:ea typeface="DejaVu Sans Book" panose="020B0603030804020204" pitchFamily="34" charset="0"/>
+              <a:cs typeface="DejaVu Sans Book" panose="020B0603030804020204" pitchFamily="34" charset="0"/>
+            </a:endParaRPr>
+          </a:p>
+        </p:txBody>
+      </p:sp>
+      <p:cxnSp>
+        <p:nvCxnSpPr>
+          <p:cNvPr id="7" name="Straight Arrow Connector 6">
+            <a:extLst>
+              <a:ext uri="{FF2B5EF4-FFF2-40B4-BE49-F238E27FC236}">
+                <a16:creationId xmlns:a16="http://schemas.microsoft.com/office/drawing/2014/main" id="{7873CED7-FD20-1841-B5DF-C1379E919DFB}"/>
+              </a:ext>
+            </a:extLst>
+          </p:cNvPr>
+          <p:cNvCxnSpPr>
+            <a:cxnSpLocks/>
+            <a:stCxn id="12" idx="1"/>
+          </p:cNvCxnSpPr>
+          <p:nvPr/>
+        </p:nvCxnSpPr>
+        <p:spPr>
+          <a:xfrm flipH="1">
+            <a:off x="2692401" y="2364502"/>
+            <a:ext cx="4728722" cy="90831"/>
+          </a:xfrm>
+          <a:prstGeom prst="straightConnector1">
+            <a:avLst/>
+          </a:prstGeom>
+          <a:ln>
+            <a:tailEnd type="triangle"/>
+          </a:ln>
+        </p:spPr>
+        <p:style>
+          <a:lnRef idx="1">
+            <a:schemeClr val="accent1"/>
+          </a:lnRef>
+          <a:fillRef idx="0">
+            <a:schemeClr val="accent1"/>
+          </a:fillRef>
+          <a:effectRef idx="0">
+            <a:schemeClr val="accent1"/>
+          </a:effectRef>
+          <a:fontRef idx="minor">
+            <a:schemeClr val="tx1"/>
+          </a:fontRef>
+        </p:style>
+      </p:cxnSp>
+      <p:cxnSp>
+        <p:nvCxnSpPr>
+          <p:cNvPr id="9" name="Straight Arrow Connector 8">
+            <a:extLst>
+              <a:ext uri="{FF2B5EF4-FFF2-40B4-BE49-F238E27FC236}">
+                <a16:creationId xmlns:a16="http://schemas.microsoft.com/office/drawing/2014/main" id="{C929463A-F4D3-9C4F-A39C-668EB9705556}"/>
+              </a:ext>
+            </a:extLst>
+          </p:cNvPr>
+          <p:cNvCxnSpPr>
+            <a:cxnSpLocks/>
+            <a:stCxn id="13" idx="1"/>
+          </p:cNvCxnSpPr>
+          <p:nvPr/>
+        </p:nvCxnSpPr>
+        <p:spPr>
+          <a:xfrm flipH="1">
+            <a:off x="2235201" y="3102248"/>
+            <a:ext cx="5830940" cy="402952"/>
+          </a:xfrm>
+          <a:prstGeom prst="straightConnector1">
+            <a:avLst/>
+          </a:prstGeom>
+          <a:ln>
+            <a:tailEnd type="triangle"/>
+          </a:ln>
+        </p:spPr>
+        <p:style>
+          <a:lnRef idx="1">
+            <a:schemeClr val="accent1"/>
+          </a:lnRef>
+          <a:fillRef idx="0">
+            <a:schemeClr val="accent1"/>
+          </a:fillRef>
+          <a:effectRef idx="0">
+            <a:schemeClr val="accent1"/>
+          </a:effectRef>
+          <a:fontRef idx="minor">
+            <a:schemeClr val="tx1"/>
+          </a:fontRef>
+        </p:style>
+      </p:cxnSp>
+      <p:cxnSp>
+        <p:nvCxnSpPr>
+          <p:cNvPr id="11" name="Straight Arrow Connector 10">
+            <a:extLst>
+              <a:ext uri="{FF2B5EF4-FFF2-40B4-BE49-F238E27FC236}">
+                <a16:creationId xmlns:a16="http://schemas.microsoft.com/office/drawing/2014/main" id="{D49F6FEB-A2EE-BA46-8C47-DCD3A1D79EE7}"/>
+              </a:ext>
+            </a:extLst>
+          </p:cNvPr>
+          <p:cNvCxnSpPr>
+            <a:cxnSpLocks/>
+            <a:stCxn id="14" idx="1"/>
+          </p:cNvCxnSpPr>
+          <p:nvPr/>
+        </p:nvCxnSpPr>
+        <p:spPr>
+          <a:xfrm flipH="1">
+            <a:off x="3471334" y="4025578"/>
+            <a:ext cx="4992020" cy="444822"/>
+          </a:xfrm>
+          <a:prstGeom prst="straightConnector1">
+            <a:avLst/>
+          </a:prstGeom>
+          <a:ln>
+            <a:tailEnd type="triangle"/>
+          </a:ln>
+        </p:spPr>
+        <p:style>
+          <a:lnRef idx="1">
+            <a:schemeClr val="accent1"/>
+          </a:lnRef>
+          <a:fillRef idx="0">
+            <a:schemeClr val="accent1"/>
+          </a:fillRef>
+          <a:effectRef idx="0">
+            <a:schemeClr val="accent1"/>
+          </a:effectRef>
+          <a:fontRef idx="minor">
+            <a:schemeClr val="tx1"/>
+          </a:fontRef>
+        </p:style>
+      </p:cxnSp>
+      <p:sp>
+        <p:nvSpPr>
+          <p:cNvPr id="12" name="TextBox 11">
+            <a:extLst>
+              <a:ext uri="{FF2B5EF4-FFF2-40B4-BE49-F238E27FC236}">
+                <a16:creationId xmlns:a16="http://schemas.microsoft.com/office/drawing/2014/main" id="{53A3556E-B4E8-7248-9E5C-2253C18012C5}"/>
+              </a:ext>
+            </a:extLst>
+          </p:cNvPr>
+          <p:cNvSpPr txBox="1"/>
+          <p:nvPr/>
+        </p:nvSpPr>
+        <p:spPr>
+          <a:xfrm>
+            <a:off x="7421123" y="1902837"/>
+            <a:ext cx="2921000" cy="923330"/>
+          </a:xfrm>
+          <a:prstGeom prst="rect">
+            <a:avLst/>
+          </a:prstGeom>
+          <a:noFill/>
+        </p:spPr>
+        <p:txBody>
+          <a:bodyPr wrap="square" rtlCol="0">
+            <a:spAutoFit/>
+          </a:bodyPr>
+          <a:lstStyle/>
+          <a:p>
+            <a:r>
+              <a:rPr lang="da-DK" dirty="0"/>
+              <a:t>Værdien c er samme reference til bunken som a </a:t>
+            </a:r>
+          </a:p>
+          <a:p>
+            <a:endParaRPr lang="en-GB" dirty="0"/>
+          </a:p>
+        </p:txBody>
+      </p:sp>
+      <p:sp>
+        <p:nvSpPr>
+          <p:cNvPr id="13" name="Rectangle 12">
+            <a:extLst>
+              <a:ext uri="{FF2B5EF4-FFF2-40B4-BE49-F238E27FC236}">
+                <a16:creationId xmlns:a16="http://schemas.microsoft.com/office/drawing/2014/main" id="{B89BEC56-419D-FB43-BF2E-AFC4B04E21B2}"/>
+              </a:ext>
+            </a:extLst>
+          </p:cNvPr>
+          <p:cNvSpPr/>
+          <p:nvPr/>
+        </p:nvSpPr>
+        <p:spPr>
+          <a:xfrm>
+            <a:off x="8066141" y="2779082"/>
+            <a:ext cx="2228715" cy="646331"/>
+          </a:xfrm>
+          <a:prstGeom prst="rect">
+            <a:avLst/>
+          </a:prstGeom>
+        </p:spPr>
+        <p:txBody>
+          <a:bodyPr wrap="square">
+            <a:spAutoFit/>
+          </a:bodyPr>
+          <a:lstStyle/>
+          <a:p>
+            <a:r>
+              <a:rPr lang="da-DK" dirty="0">
+                <a:latin typeface="Calibri" panose="020F0502020204030204" pitchFamily="34" charset="0"/>
+              </a:rPr>
+              <a:t>Ændrer hvad reference peger på </a:t>
+            </a:r>
+            <a:endParaRPr lang="da-DK" dirty="0">
+              <a:effectLst/>
+            </a:endParaRPr>
+          </a:p>
+        </p:txBody>
+      </p:sp>
+      <p:sp>
+        <p:nvSpPr>
+          <p:cNvPr id="14" name="Rectangle 13">
+            <a:extLst>
+              <a:ext uri="{FF2B5EF4-FFF2-40B4-BE49-F238E27FC236}">
+                <a16:creationId xmlns:a16="http://schemas.microsoft.com/office/drawing/2014/main" id="{B366D281-483C-8B49-9761-97920D331E4E}"/>
+              </a:ext>
+            </a:extLst>
+          </p:cNvPr>
+          <p:cNvSpPr/>
+          <p:nvPr/>
+        </p:nvSpPr>
+        <p:spPr>
+          <a:xfrm>
+            <a:off x="8463354" y="3702412"/>
+            <a:ext cx="2528901" cy="646331"/>
+          </a:xfrm>
+          <a:prstGeom prst="rect">
+            <a:avLst/>
+          </a:prstGeom>
+        </p:spPr>
+        <p:txBody>
+          <a:bodyPr wrap="square">
+            <a:spAutoFit/>
+          </a:bodyPr>
+          <a:lstStyle/>
+          <a:p>
+            <a:r>
+              <a:rPr lang="da-DK" dirty="0">
+                <a:latin typeface="Calibri" panose="020F0502020204030204" pitchFamily="34" charset="0"/>
+              </a:rPr>
+              <a:t>Indholdet af a ændrede sig indirekte! </a:t>
+            </a:r>
+            <a:endParaRPr lang="da-DK" dirty="0">
+              <a:effectLst/>
+            </a:endParaRPr>
+          </a:p>
+        </p:txBody>
+      </p:sp>
+    </p:spTree>
+    <p:extLst>
+      <p:ext uri="{BB962C8B-B14F-4D97-AF65-F5344CB8AC3E}">
+        <p14:creationId xmlns:p14="http://schemas.microsoft.com/office/powerpoint/2010/main" val="3209069691"/>
+      </p:ext>
+    </p:extLst>
+  </p:cSld>
+  <p:clrMapOvr>
+    <a:masterClrMapping/>
+  </p:clrMapOvr>
+</p:sld>
+</file>
+
+<file path=ppt/slides/slide6.xml><?xml version="1.0" encoding="utf-8"?>
 <p:sld xmlns:a="http://schemas.openxmlformats.org/drawingml/2006/main" xmlns:r="http://schemas.openxmlformats.org/officeDocument/2006/relationships" xmlns:p="http://schemas.openxmlformats.org/presentationml/2006/main">
   <p:cSld>
     <p:spTree>
@@ -4807,7 +7017,7 @@
 </p:sld>
 </file>
 
-<file path=ppt/slides/slide5.xml><?xml version="1.0" encoding="utf-8"?>
+<file path=ppt/slides/slide7.xml><?xml version="1.0" encoding="utf-8"?>
 <p:sld xmlns:a="http://schemas.openxmlformats.org/drawingml/2006/main" xmlns:r="http://schemas.openxmlformats.org/officeDocument/2006/relationships" xmlns:p="http://schemas.openxmlformats.org/presentationml/2006/main">
   <p:cSld>
     <p:spTree>
@@ -5469,7 +7679,7 @@
 </p:sld>
 </file>
 
-<file path=ppt/slides/slide6.xml><?xml version="1.0" encoding="utf-8"?>
+<file path=ppt/slides/slide8.xml><?xml version="1.0" encoding="utf-8"?>
 <p:sld xmlns:a="http://schemas.openxmlformats.org/drawingml/2006/main" xmlns:r="http://schemas.openxmlformats.org/officeDocument/2006/relationships" xmlns:p="http://schemas.openxmlformats.org/presentationml/2006/main">
   <p:cSld>
     <p:spTree>
@@ -5838,6 +8048,124 @@
           </a:fontRef>
         </p:style>
       </p:cxnSp>
+      <p:grpSp>
+        <p:nvGrpSpPr>
+          <p:cNvPr id="10" name="Group 9">
+            <a:extLst>
+              <a:ext uri="{FF2B5EF4-FFF2-40B4-BE49-F238E27FC236}">
+                <a16:creationId xmlns:a16="http://schemas.microsoft.com/office/drawing/2014/main" id="{27D76DFC-D472-2B47-83CD-D0A2DA345B74}"/>
+              </a:ext>
+            </a:extLst>
+          </p:cNvPr>
+          <p:cNvGrpSpPr>
+            <a:grpSpLocks noChangeAspect="1"/>
+          </p:cNvGrpSpPr>
+          <p:nvPr/>
+        </p:nvGrpSpPr>
+        <p:grpSpPr>
+          <a:xfrm>
+            <a:off x="9981896" y="276383"/>
+            <a:ext cx="1841962" cy="2187448"/>
+            <a:chOff x="736441" y="1690690"/>
+            <a:chExt cx="2797993" cy="3181863"/>
+          </a:xfrm>
+        </p:grpSpPr>
+        <p:pic>
+          <p:nvPicPr>
+            <p:cNvPr id="11" name="Picture 10">
+              <a:extLst>
+                <a:ext uri="{FF2B5EF4-FFF2-40B4-BE49-F238E27FC236}">
+                  <a16:creationId xmlns:a16="http://schemas.microsoft.com/office/drawing/2014/main" id="{8C3850C0-E144-834A-87EB-D4714A08A789}"/>
+                </a:ext>
+              </a:extLst>
+            </p:cNvPr>
+            <p:cNvPicPr>
+              <a:picLocks noChangeAspect="1"/>
+            </p:cNvPicPr>
+            <p:nvPr/>
+          </p:nvPicPr>
+          <p:blipFill>
+            <a:blip r:embed="rId2"/>
+            <a:stretch>
+              <a:fillRect/>
+            </a:stretch>
+          </p:blipFill>
+          <p:spPr>
+            <a:xfrm>
+              <a:off x="838199" y="1690690"/>
+              <a:ext cx="2696235" cy="2696235"/>
+            </a:xfrm>
+            <a:prstGeom prst="rect">
+              <a:avLst/>
+            </a:prstGeom>
+          </p:spPr>
+        </p:pic>
+        <p:sp>
+          <p:nvSpPr>
+            <p:cNvPr id="12" name="TextBox 11">
+              <a:extLst>
+                <a:ext uri="{FF2B5EF4-FFF2-40B4-BE49-F238E27FC236}">
+                  <a16:creationId xmlns:a16="http://schemas.microsoft.com/office/drawing/2014/main" id="{DEDCD557-CDA4-8945-B259-BF325D6CD5BE}"/>
+                </a:ext>
+              </a:extLst>
+            </p:cNvPr>
+            <p:cNvSpPr txBox="1"/>
+            <p:nvPr/>
+          </p:nvSpPr>
+          <p:spPr>
+            <a:xfrm>
+              <a:off x="736441" y="4514400"/>
+              <a:ext cx="2730130" cy="358153"/>
+            </a:xfrm>
+            <a:prstGeom prst="rect">
+              <a:avLst/>
+            </a:prstGeom>
+            <a:noFill/>
+          </p:spPr>
+          <p:txBody>
+            <a:bodyPr wrap="none" rtlCol="0">
+              <a:spAutoFit/>
+            </a:bodyPr>
+            <a:lstStyle/>
+            <a:p>
+              <a:r>
+                <a:rPr lang="en-GB" sz="500" dirty="0"/>
+                <a:t>By I, </a:t>
+              </a:r>
+              <a:r>
+                <a:rPr lang="en-GB" sz="500" dirty="0" err="1"/>
+                <a:t>KSmrq</a:t>
+              </a:r>
+              <a:r>
+                <a:rPr lang="en-GB" sz="500" dirty="0"/>
+                <a:t>, CC BY-SA 3.0, </a:t>
+              </a:r>
+            </a:p>
+            <a:p>
+              <a:r>
+                <a:rPr lang="en-GB" sz="500" dirty="0"/>
+                <a:t>https://</a:t>
+              </a:r>
+              <a:r>
+                <a:rPr lang="en-GB" sz="500" dirty="0" err="1"/>
+                <a:t>commons.wikimedia.org</a:t>
+              </a:r>
+              <a:r>
+                <a:rPr lang="en-GB" sz="500" dirty="0"/>
+                <a:t>/w/</a:t>
+              </a:r>
+              <a:r>
+                <a:rPr lang="en-GB" sz="500" dirty="0" err="1"/>
+                <a:t>index.php?curid</a:t>
+              </a:r>
+              <a:r>
+                <a:rPr lang="en-GB" sz="500" dirty="0"/>
+                <a:t>=2347919</a:t>
+              </a:r>
+            </a:p>
+          </p:txBody>
+        </p:sp>
+      </p:grpSp>
     </p:spTree>
     <p:extLst>
       <p:ext uri="{BB962C8B-B14F-4D97-AF65-F5344CB8AC3E}">
@@ -6029,7 +8357,7 @@
 </p:sld>
 </file>
 
-<file path=ppt/slides/slide7.xml><?xml version="1.0" encoding="utf-8"?>
+<file path=ppt/slides/slide9.xml><?xml version="1.0" encoding="utf-8"?>
 <p:sld xmlns:a="http://schemas.openxmlformats.org/drawingml/2006/main" xmlns:r="http://schemas.openxmlformats.org/officeDocument/2006/relationships" xmlns:p="http://schemas.openxmlformats.org/presentationml/2006/main">
   <p:cSld>
     <p:bg>

</xml_diff>